<commit_message>
adding Models folder and updated .pptx
</commit_message>
<xml_diff>
--- a/Project 4 Presentation.pptx
+++ b/Project 4 Presentation.pptx
@@ -5,17 +5,16 @@
     <p:sldMasterId id="2147483673" r:id="rId1"/>
   </p:sldMasterIdLst>
   <p:notesMasterIdLst>
-    <p:notesMasterId r:id="rId10"/>
+    <p:notesMasterId r:id="rId9"/>
   </p:notesMasterIdLst>
   <p:sldIdLst>
     <p:sldId id="256" r:id="rId2"/>
     <p:sldId id="268" r:id="rId3"/>
-    <p:sldId id="269" r:id="rId4"/>
-    <p:sldId id="270" r:id="rId5"/>
-    <p:sldId id="271" r:id="rId6"/>
-    <p:sldId id="272" r:id="rId7"/>
-    <p:sldId id="263" r:id="rId8"/>
-    <p:sldId id="264" r:id="rId9"/>
+    <p:sldId id="273" r:id="rId4"/>
+    <p:sldId id="274" r:id="rId5"/>
+    <p:sldId id="270" r:id="rId6"/>
+    <p:sldId id="263" r:id="rId7"/>
+    <p:sldId id="264" r:id="rId8"/>
   </p:sldIdLst>
   <p:sldSz cx="12192000" cy="6858000"/>
   <p:notesSz cx="6858000" cy="9144000"/>
@@ -204,7 +203,7 @@
           <a:p>
             <a:fld id="{BF5AA480-C879-5647-9213-4AB0980B2004}" type="datetimeFigureOut">
               <a:rPr lang="en-US" smtClean="0"/>
-              <a:t>1/7/25</a:t>
+              <a:t>1/9/25</a:t>
             </a:fld>
             <a:endParaRPr lang="en-US"/>
           </a:p>
@@ -642,6 +641,848 @@
 </p:notes>
 </file>
 
+<file path=ppt/notesSlides/notesSlide3.xml><?xml version="1.0" encoding="utf-8"?>
+<p:notes xmlns:a="http://schemas.openxmlformats.org/drawingml/2006/main" xmlns:r="http://schemas.openxmlformats.org/officeDocument/2006/relationships" xmlns:p="http://schemas.openxmlformats.org/presentationml/2006/main">
+  <p:cSld>
+    <p:spTree>
+      <p:nvGrpSpPr>
+        <p:cNvPr id="1" name=""/>
+        <p:cNvGrpSpPr/>
+        <p:nvPr/>
+      </p:nvGrpSpPr>
+      <p:grpSpPr>
+        <a:xfrm>
+          <a:off x="0" y="0"/>
+          <a:ext cx="0" cy="0"/>
+          <a:chOff x="0" y="0"/>
+          <a:chExt cx="0" cy="0"/>
+        </a:xfrm>
+      </p:grpSpPr>
+      <p:sp>
+        <p:nvSpPr>
+          <p:cNvPr id="2" name="Slide Image Placeholder 1"/>
+          <p:cNvSpPr>
+            <a:spLocks noGrp="1" noRot="1" noChangeAspect="1"/>
+          </p:cNvSpPr>
+          <p:nvPr>
+            <p:ph type="sldImg"/>
+          </p:nvPr>
+        </p:nvSpPr>
+        <p:spPr/>
+      </p:sp>
+      <p:sp>
+        <p:nvSpPr>
+          <p:cNvPr id="3" name="Notes Placeholder 2"/>
+          <p:cNvSpPr>
+            <a:spLocks noGrp="1"/>
+          </p:cNvSpPr>
+          <p:nvPr>
+            <p:ph type="body" idx="1"/>
+          </p:nvPr>
+        </p:nvSpPr>
+        <p:spPr/>
+        <p:txBody>
+          <a:bodyPr/>
+          <a:lstStyle/>
+          <a:p>
+            <a:r>
+              <a:rPr lang="en-US" b="1" dirty="0"/>
+              <a:t>Logistic Regression Model: </a:t>
+            </a:r>
+            <a:r>
+              <a:rPr lang="en-US" dirty="0"/>
+              <a:t>While we were able to achieve higher recall values for Class 1 (fraudulent transactions), there was extremely low precision, meaning it often predicts more false positives, flagging legitimate transactions as fraudulent. This model did not perform well due to the imbalanced dataset.</a:t>
+            </a:r>
+          </a:p>
+          <a:p>
+            <a:endParaRPr lang="en-US" dirty="0"/>
+          </a:p>
+          <a:p>
+            <a:r>
+              <a:rPr lang="en-US" b="1" dirty="0"/>
+              <a:t>Random Forest Model with SMOTE: </a:t>
+            </a:r>
+            <a:r>
+              <a:rPr lang="en-US" b="0" dirty="0"/>
+              <a:t>When originally testing the Random Forest model, we were able to attain perfect precision for fraud detection. However, that came at a cost of very low recall and not detecting enough fraud cases. To account for the imbalanced datasets, where the minority class is underrepresented, we incorporated SMOTE with our random forest model.</a:t>
+            </a:r>
+          </a:p>
+          <a:p>
+            <a:endParaRPr lang="en-US" b="0" dirty="0"/>
+          </a:p>
+          <a:p>
+            <a:r>
+              <a:rPr lang="en-US" b="0" dirty="0"/>
+              <a:t>*SMOTE (Synthetic Minority Oversampling Technique):</a:t>
+            </a:r>
+          </a:p>
+          <a:p>
+            <a:pPr marL="0" marR="0" lvl="0" indent="0" algn="l" defTabSz="914400" rtl="0" eaLnBrk="1" fontAlgn="auto" latinLnBrk="0" hangingPunct="1">
+              <a:lnSpc>
+                <a:spcPct val="100000"/>
+              </a:lnSpc>
+              <a:spcBef>
+                <a:spcPts val="0"/>
+              </a:spcBef>
+              <a:spcAft>
+                <a:spcPts val="0"/>
+              </a:spcAft>
+              <a:buClrTx/>
+              <a:buSzTx/>
+              <a:buFontTx/>
+              <a:buNone/>
+              <a:tabLst/>
+              <a:defRPr/>
+            </a:pPr>
+            <a:r>
+              <a:rPr lang="en-US" dirty="0">
+                <a:solidFill>
+                  <a:srgbClr val="0E0E0E"/>
+                </a:solidFill>
+                <a:effectLst/>
+                <a:latin typeface=".AppleSystemUIFont"/>
+              </a:rPr>
+              <a:t>SMOTE is a data augmentation technique used to address class imbalance in datasets, especially in machine learning problems. It generates synthetic samples for the minority class by interpolating between existing minority class samples, rather than simply duplicating them. (looking at the 5 nearest neighbors by default)</a:t>
+            </a:r>
+          </a:p>
+          <a:p>
+            <a:endParaRPr lang="en-US" b="0" dirty="0"/>
+          </a:p>
+          <a:p>
+            <a:pPr marL="0" marR="0" lvl="0" indent="0" algn="l" defTabSz="914400" rtl="0" eaLnBrk="1" fontAlgn="auto" latinLnBrk="0" hangingPunct="1">
+              <a:lnSpc>
+                <a:spcPct val="100000"/>
+              </a:lnSpc>
+              <a:spcBef>
+                <a:spcPts val="0"/>
+              </a:spcBef>
+              <a:spcAft>
+                <a:spcPts val="0"/>
+              </a:spcAft>
+              <a:buClrTx/>
+              <a:buSzTx/>
+              <a:buFontTx/>
+              <a:buNone/>
+              <a:tabLst/>
+              <a:defRPr/>
+            </a:pPr>
+            <a:r>
+              <a:rPr lang="en-US" dirty="0"/>
+              <a:t>*If the priority is to detect as many frauds as possible, Logistic Regression is a good model due to the higher recall. However, if the priority is to reduce false positives while maintaining good accuracy, Random Forest with SMOTE appears to be the better option.</a:t>
+            </a:r>
+          </a:p>
+          <a:p>
+            <a:endParaRPr lang="en-US" b="1" dirty="0"/>
+          </a:p>
+          <a:p>
+            <a:r>
+              <a:rPr lang="en-US" b="0" dirty="0"/>
+              <a:t>*Model selection was based on training and testing on smaller dataset 23k records</a:t>
+            </a:r>
+          </a:p>
+        </p:txBody>
+      </p:sp>
+      <p:sp>
+        <p:nvSpPr>
+          <p:cNvPr id="4" name="Slide Number Placeholder 3"/>
+          <p:cNvSpPr>
+            <a:spLocks noGrp="1"/>
+          </p:cNvSpPr>
+          <p:nvPr>
+            <p:ph type="sldNum" sz="quarter" idx="5"/>
+          </p:nvPr>
+        </p:nvSpPr>
+        <p:spPr/>
+        <p:txBody>
+          <a:bodyPr/>
+          <a:lstStyle/>
+          <a:p>
+            <a:fld id="{492B2B1A-E91C-F249-97E5-61AB060BBE8D}" type="slidenum">
+              <a:rPr lang="en-US" smtClean="0"/>
+              <a:t>3</a:t>
+            </a:fld>
+            <a:endParaRPr lang="en-US"/>
+          </a:p>
+        </p:txBody>
+      </p:sp>
+    </p:spTree>
+    <p:extLst>
+      <p:ext uri="{BB962C8B-B14F-4D97-AF65-F5344CB8AC3E}">
+        <p14:creationId xmlns:p14="http://schemas.microsoft.com/office/powerpoint/2010/main" val="3246705064"/>
+      </p:ext>
+    </p:extLst>
+  </p:cSld>
+  <p:clrMapOvr>
+    <a:masterClrMapping/>
+  </p:clrMapOvr>
+</p:notes>
+</file>
+
+<file path=ppt/notesSlides/notesSlide4.xml><?xml version="1.0" encoding="utf-8"?>
+<p:notes xmlns:a="http://schemas.openxmlformats.org/drawingml/2006/main" xmlns:r="http://schemas.openxmlformats.org/officeDocument/2006/relationships" xmlns:p="http://schemas.openxmlformats.org/presentationml/2006/main">
+  <p:cSld>
+    <p:spTree>
+      <p:nvGrpSpPr>
+        <p:cNvPr id="1" name=""/>
+        <p:cNvGrpSpPr/>
+        <p:nvPr/>
+      </p:nvGrpSpPr>
+      <p:grpSpPr>
+        <a:xfrm>
+          <a:off x="0" y="0"/>
+          <a:ext cx="0" cy="0"/>
+          <a:chOff x="0" y="0"/>
+          <a:chExt cx="0" cy="0"/>
+        </a:xfrm>
+      </p:grpSpPr>
+      <p:sp>
+        <p:nvSpPr>
+          <p:cNvPr id="2" name="Slide Image Placeholder 1"/>
+          <p:cNvSpPr>
+            <a:spLocks noGrp="1" noRot="1" noChangeAspect="1"/>
+          </p:cNvSpPr>
+          <p:nvPr>
+            <p:ph type="sldImg"/>
+          </p:nvPr>
+        </p:nvSpPr>
+        <p:spPr/>
+      </p:sp>
+      <p:sp>
+        <p:nvSpPr>
+          <p:cNvPr id="3" name="Notes Placeholder 2"/>
+          <p:cNvSpPr>
+            <a:spLocks noGrp="1"/>
+          </p:cNvSpPr>
+          <p:nvPr>
+            <p:ph type="body" idx="1"/>
+          </p:nvPr>
+        </p:nvSpPr>
+        <p:spPr/>
+        <p:txBody>
+          <a:bodyPr/>
+          <a:lstStyle/>
+          <a:p>
+            <a:r>
+              <a:rPr lang="en-US" b="1" dirty="0"/>
+              <a:t>Random Forest Model with SMOTE: </a:t>
+            </a:r>
+            <a:r>
+              <a:rPr lang="en-US" b="0" dirty="0"/>
+              <a:t>While Random Forest with SMOTE did a better job with precision than the logistic regression, precision was still on the low end, leading to more false positives.</a:t>
+            </a:r>
+          </a:p>
+          <a:p>
+            <a:endParaRPr lang="en-US" b="0" dirty="0"/>
+          </a:p>
+          <a:p>
+            <a:r>
+              <a:rPr lang="en-US" b="1" dirty="0" err="1"/>
+              <a:t>XGBoost</a:t>
+            </a:r>
+            <a:r>
+              <a:rPr lang="en-US" b="1" dirty="0"/>
+              <a:t> Model: </a:t>
+            </a:r>
+            <a:r>
+              <a:rPr lang="en-US" b="0" dirty="0"/>
+              <a:t>The </a:t>
+            </a:r>
+            <a:r>
+              <a:rPr lang="en-US" b="0" dirty="0" err="1"/>
+              <a:t>XGBoost</a:t>
+            </a:r>
+            <a:r>
+              <a:rPr lang="en-US" b="0" dirty="0"/>
+              <a:t> model significantly outperformed the Random Forest model with SMOTE in precision (57% versus 33%), with fewer false positives. While recall remained the same (48%), </a:t>
+            </a:r>
+            <a:r>
+              <a:rPr lang="en-US" b="0" dirty="0" err="1"/>
+              <a:t>XGBoost</a:t>
+            </a:r>
+            <a:r>
+              <a:rPr lang="en-US" b="0" dirty="0"/>
+              <a:t> achieved a better balance between precision and recall, with better performance in overall accuracy and in handling the imbalanced dataset.</a:t>
+            </a:r>
+            <a:endParaRPr lang="en-US" b="1" dirty="0"/>
+          </a:p>
+          <a:p>
+            <a:endParaRPr lang="en-US" b="1" dirty="0"/>
+          </a:p>
+          <a:p>
+            <a:r>
+              <a:rPr lang="en-US" b="0" dirty="0"/>
+              <a:t>*</a:t>
+            </a:r>
+            <a:r>
+              <a:rPr lang="en-US" b="0" dirty="0" err="1"/>
+              <a:t>XGBoost</a:t>
+            </a:r>
+            <a:r>
+              <a:rPr lang="en-US" b="0" dirty="0"/>
+              <a:t> (Extreme Gradient Boosting):</a:t>
+            </a:r>
+          </a:p>
+          <a:p>
+            <a:r>
+              <a:rPr lang="en-US" b="0" i="0" dirty="0" err="1">
+                <a:solidFill>
+                  <a:srgbClr val="D1D2D3"/>
+                </a:solidFill>
+                <a:effectLst/>
+                <a:latin typeface="Slack-Lato"/>
+              </a:rPr>
+              <a:t>XGBoost</a:t>
+            </a:r>
+            <a:r>
+              <a:rPr lang="en-US" b="0" i="0" dirty="0">
+                <a:solidFill>
+                  <a:srgbClr val="D1D2D3"/>
+                </a:solidFill>
+                <a:effectLst/>
+                <a:latin typeface="Slack-Lato"/>
+              </a:rPr>
+              <a:t> is a gradient-boosting algorithm designed for optimized performance and speed. It sequentially builds decision trees, correcting errors made by previous trees. Instead of using SMOTE, </a:t>
+            </a:r>
+            <a:r>
+              <a:rPr lang="en-US" b="0" i="0" dirty="0" err="1">
+                <a:solidFill>
+                  <a:srgbClr val="D1D2D3"/>
+                </a:solidFill>
+                <a:effectLst/>
+                <a:latin typeface="Slack-Lato"/>
+              </a:rPr>
+              <a:t>XGBoost</a:t>
+            </a:r>
+            <a:r>
+              <a:rPr lang="en-US" b="0" i="0" dirty="0">
+                <a:solidFill>
+                  <a:srgbClr val="D1D2D3"/>
+                </a:solidFill>
+                <a:effectLst/>
+                <a:latin typeface="Slack-Lato"/>
+              </a:rPr>
+              <a:t> addresses class imbalance through its </a:t>
+            </a:r>
+            <a:r>
+              <a:rPr lang="en-US" b="0" i="0" dirty="0" err="1">
+                <a:solidFill>
+                  <a:srgbClr val="D1D2D3"/>
+                </a:solidFill>
+                <a:effectLst/>
+                <a:latin typeface="Slack-Lato"/>
+              </a:rPr>
+              <a:t>scale_pos_weight</a:t>
+            </a:r>
+            <a:r>
+              <a:rPr lang="en-US" b="0" i="0" dirty="0">
+                <a:solidFill>
+                  <a:srgbClr val="D1D2D3"/>
+                </a:solidFill>
+                <a:effectLst/>
+                <a:latin typeface="Slack-Lato"/>
+              </a:rPr>
+              <a:t> parameter, which adjusts the importance of the minority class.</a:t>
+            </a:r>
+          </a:p>
+          <a:p>
+            <a:endParaRPr lang="en-US" b="0" i="0" dirty="0">
+              <a:solidFill>
+                <a:srgbClr val="D1D2D3"/>
+              </a:solidFill>
+              <a:effectLst/>
+              <a:latin typeface="Slack-Lato"/>
+            </a:endParaRPr>
+          </a:p>
+          <a:p>
+            <a:pPr marL="0" marR="0" lvl="0" indent="0" algn="l" defTabSz="914400" rtl="0" eaLnBrk="1" fontAlgn="auto" latinLnBrk="0" hangingPunct="1">
+              <a:lnSpc>
+                <a:spcPct val="100000"/>
+              </a:lnSpc>
+              <a:spcBef>
+                <a:spcPts val="0"/>
+              </a:spcBef>
+              <a:spcAft>
+                <a:spcPts val="0"/>
+              </a:spcAft>
+              <a:buClrTx/>
+              <a:buSzTx/>
+              <a:buFontTx/>
+              <a:buNone/>
+              <a:tabLst/>
+              <a:defRPr/>
+            </a:pPr>
+            <a:r>
+              <a:rPr lang="en-US" b="0" dirty="0"/>
+              <a:t>*Model selection was based on training and testing on smaller dataset 23k records</a:t>
+            </a:r>
+          </a:p>
+          <a:p>
+            <a:endParaRPr lang="en-US" b="0" dirty="0"/>
+          </a:p>
+        </p:txBody>
+      </p:sp>
+      <p:sp>
+        <p:nvSpPr>
+          <p:cNvPr id="4" name="Slide Number Placeholder 3"/>
+          <p:cNvSpPr>
+            <a:spLocks noGrp="1"/>
+          </p:cNvSpPr>
+          <p:nvPr>
+            <p:ph type="sldNum" sz="quarter" idx="5"/>
+          </p:nvPr>
+        </p:nvSpPr>
+        <p:spPr/>
+        <p:txBody>
+          <a:bodyPr/>
+          <a:lstStyle/>
+          <a:p>
+            <a:fld id="{492B2B1A-E91C-F249-97E5-61AB060BBE8D}" type="slidenum">
+              <a:rPr lang="en-US" smtClean="0"/>
+              <a:t>4</a:t>
+            </a:fld>
+            <a:endParaRPr lang="en-US"/>
+          </a:p>
+        </p:txBody>
+      </p:sp>
+    </p:spTree>
+    <p:extLst>
+      <p:ext uri="{BB962C8B-B14F-4D97-AF65-F5344CB8AC3E}">
+        <p14:creationId xmlns:p14="http://schemas.microsoft.com/office/powerpoint/2010/main" val="1390183804"/>
+      </p:ext>
+    </p:extLst>
+  </p:cSld>
+  <p:clrMapOvr>
+    <a:masterClrMapping/>
+  </p:clrMapOvr>
+</p:notes>
+</file>
+
+<file path=ppt/notesSlides/notesSlide5.xml><?xml version="1.0" encoding="utf-8"?>
+<p:notes xmlns:a="http://schemas.openxmlformats.org/drawingml/2006/main" xmlns:r="http://schemas.openxmlformats.org/officeDocument/2006/relationships" xmlns:p="http://schemas.openxmlformats.org/presentationml/2006/main">
+  <p:cSld>
+    <p:spTree>
+      <p:nvGrpSpPr>
+        <p:cNvPr id="1" name=""/>
+        <p:cNvGrpSpPr/>
+        <p:nvPr/>
+      </p:nvGrpSpPr>
+      <p:grpSpPr>
+        <a:xfrm>
+          <a:off x="0" y="0"/>
+          <a:ext cx="0" cy="0"/>
+          <a:chOff x="0" y="0"/>
+          <a:chExt cx="0" cy="0"/>
+        </a:xfrm>
+      </p:grpSpPr>
+      <p:sp>
+        <p:nvSpPr>
+          <p:cNvPr id="2" name="Slide Image Placeholder 1"/>
+          <p:cNvSpPr>
+            <a:spLocks noGrp="1" noRot="1" noChangeAspect="1"/>
+          </p:cNvSpPr>
+          <p:nvPr>
+            <p:ph type="sldImg"/>
+          </p:nvPr>
+        </p:nvSpPr>
+        <p:spPr/>
+      </p:sp>
+      <p:sp>
+        <p:nvSpPr>
+          <p:cNvPr id="3" name="Notes Placeholder 2"/>
+          <p:cNvSpPr>
+            <a:spLocks noGrp="1"/>
+          </p:cNvSpPr>
+          <p:nvPr>
+            <p:ph type="body" idx="1"/>
+          </p:nvPr>
+        </p:nvSpPr>
+        <p:spPr/>
+        <p:txBody>
+          <a:bodyPr/>
+          <a:lstStyle/>
+          <a:p>
+            <a:pPr>
+              <a:spcBef>
+                <a:spcPts val="900"/>
+              </a:spcBef>
+            </a:pPr>
+            <a:r>
+              <a:rPr lang="en-US" dirty="0">
+                <a:solidFill>
+                  <a:srgbClr val="0E0E0E"/>
+                </a:solidFill>
+                <a:effectLst/>
+                <a:latin typeface=".AppleSystemUIFont"/>
+              </a:rPr>
+              <a:t>1. </a:t>
+            </a:r>
+            <a:r>
+              <a:rPr lang="en-US" b="1" dirty="0">
+                <a:solidFill>
+                  <a:srgbClr val="0E0E0E"/>
+                </a:solidFill>
+                <a:effectLst/>
+                <a:latin typeface=".AppleSystemUIFont"/>
+              </a:rPr>
+              <a:t>High Precision at Low Recall</a:t>
+            </a:r>
+            <a:r>
+              <a:rPr lang="en-US" dirty="0">
+                <a:solidFill>
+                  <a:srgbClr val="0E0E0E"/>
+                </a:solidFill>
+                <a:effectLst/>
+                <a:latin typeface=".AppleSystemUIFont"/>
+              </a:rPr>
+              <a:t>:</a:t>
+            </a:r>
+          </a:p>
+          <a:p>
+            <a:pPr lvl="1">
+              <a:spcBef>
+                <a:spcPts val="900"/>
+              </a:spcBef>
+            </a:pPr>
+            <a:r>
+              <a:rPr lang="en-US" dirty="0">
+                <a:solidFill>
+                  <a:srgbClr val="0E0E0E"/>
+                </a:solidFill>
+                <a:effectLst/>
+                <a:latin typeface=".AppleSystemUIFont"/>
+              </a:rPr>
+              <a:t>On the left side of the curve, the precision is close to 1.0 when recall is very low. This indicates that when the model predicts very few transactions as fraudulent, it is mostly correct (fewer false positives). However, it is missing a lot of actual fraudulent transactions.</a:t>
+            </a:r>
+          </a:p>
+          <a:p>
+            <a:pPr>
+              <a:spcBef>
+                <a:spcPts val="900"/>
+              </a:spcBef>
+            </a:pPr>
+            <a:endParaRPr lang="en-US" dirty="0">
+              <a:solidFill>
+                <a:srgbClr val="0E0E0E"/>
+              </a:solidFill>
+              <a:effectLst/>
+              <a:latin typeface=".AppleSystemUIFont"/>
+            </a:endParaRPr>
+          </a:p>
+          <a:p>
+            <a:pPr>
+              <a:spcBef>
+                <a:spcPts val="900"/>
+              </a:spcBef>
+            </a:pPr>
+            <a:r>
+              <a:rPr lang="en-US" dirty="0">
+                <a:solidFill>
+                  <a:srgbClr val="0E0E0E"/>
+                </a:solidFill>
+                <a:effectLst/>
+                <a:latin typeface=".AppleSystemUIFont"/>
+              </a:rPr>
+              <a:t>2. </a:t>
+            </a:r>
+            <a:r>
+              <a:rPr lang="en-US" b="1" dirty="0">
+                <a:solidFill>
+                  <a:srgbClr val="0E0E0E"/>
+                </a:solidFill>
+                <a:effectLst/>
+                <a:latin typeface=".AppleSystemUIFont"/>
+              </a:rPr>
+              <a:t>Trade-Off</a:t>
+            </a:r>
+            <a:r>
+              <a:rPr lang="en-US" dirty="0">
+                <a:solidFill>
+                  <a:srgbClr val="0E0E0E"/>
+                </a:solidFill>
+                <a:effectLst/>
+                <a:latin typeface=".AppleSystemUIFont"/>
+              </a:rPr>
+              <a:t>:</a:t>
+            </a:r>
+          </a:p>
+          <a:p>
+            <a:pPr lvl="1">
+              <a:spcBef>
+                <a:spcPts val="900"/>
+              </a:spcBef>
+            </a:pPr>
+            <a:r>
+              <a:rPr lang="en-US" dirty="0">
+                <a:solidFill>
+                  <a:srgbClr val="0E0E0E"/>
+                </a:solidFill>
+                <a:effectLst/>
+                <a:latin typeface=".AppleSystemUIFont"/>
+              </a:rPr>
+              <a:t>As recall increases (moving right along the x-axis), the precision decreases. This is because, to catch more fraudulent transactions, the model starts predicting more transactions as fraudulent, which increases false positives.</a:t>
+            </a:r>
+          </a:p>
+          <a:p>
+            <a:pPr>
+              <a:spcBef>
+                <a:spcPts val="900"/>
+              </a:spcBef>
+            </a:pPr>
+            <a:endParaRPr lang="en-US" dirty="0">
+              <a:solidFill>
+                <a:srgbClr val="0E0E0E"/>
+              </a:solidFill>
+              <a:effectLst/>
+              <a:latin typeface=".AppleSystemUIFont"/>
+            </a:endParaRPr>
+          </a:p>
+          <a:p>
+            <a:pPr>
+              <a:spcBef>
+                <a:spcPts val="900"/>
+              </a:spcBef>
+            </a:pPr>
+            <a:r>
+              <a:rPr lang="en-US" dirty="0">
+                <a:solidFill>
+                  <a:srgbClr val="0E0E0E"/>
+                </a:solidFill>
+                <a:effectLst/>
+                <a:latin typeface=".AppleSystemUIFont"/>
+              </a:rPr>
+              <a:t>3. </a:t>
+            </a:r>
+            <a:r>
+              <a:rPr lang="en-US" b="1" dirty="0">
+                <a:solidFill>
+                  <a:srgbClr val="0E0E0E"/>
+                </a:solidFill>
+                <a:effectLst/>
+                <a:latin typeface=".AppleSystemUIFont"/>
+              </a:rPr>
+              <a:t>Model Performance</a:t>
+            </a:r>
+            <a:r>
+              <a:rPr lang="en-US" dirty="0">
+                <a:solidFill>
+                  <a:srgbClr val="0E0E0E"/>
+                </a:solidFill>
+                <a:effectLst/>
+                <a:latin typeface=".AppleSystemUIFont"/>
+              </a:rPr>
+              <a:t>:</a:t>
+            </a:r>
+          </a:p>
+          <a:p>
+            <a:pPr lvl="1">
+              <a:spcBef>
+                <a:spcPts val="900"/>
+              </a:spcBef>
+            </a:pPr>
+            <a:r>
+              <a:rPr lang="en-US" dirty="0">
+                <a:solidFill>
+                  <a:srgbClr val="0E0E0E"/>
+                </a:solidFill>
+                <a:effectLst/>
+                <a:latin typeface=".AppleSystemUIFont"/>
+              </a:rPr>
+              <a:t>The area under the curve gives a sense of how well the model performs. If the curve stays high (closer to 1.0), it indicates that the model maintains a good balance between precision and recall. A steep drop-off in precision as recall increases may indicate a trade-off between identifying true positives and avoiding false positives.</a:t>
+            </a:r>
+          </a:p>
+          <a:p>
+            <a:pPr>
+              <a:spcBef>
+                <a:spcPts val="900"/>
+              </a:spcBef>
+            </a:pPr>
+            <a:endParaRPr lang="en-US" dirty="0">
+              <a:solidFill>
+                <a:srgbClr val="0E0E0E"/>
+              </a:solidFill>
+              <a:effectLst/>
+              <a:latin typeface=".AppleSystemUIFont"/>
+            </a:endParaRPr>
+          </a:p>
+          <a:p>
+            <a:pPr>
+              <a:spcBef>
+                <a:spcPts val="900"/>
+              </a:spcBef>
+            </a:pPr>
+            <a:r>
+              <a:rPr lang="en-US" dirty="0">
+                <a:solidFill>
+                  <a:srgbClr val="0E0E0E"/>
+                </a:solidFill>
+                <a:effectLst/>
+                <a:latin typeface=".AppleSystemUIFont"/>
+              </a:rPr>
+              <a:t>4. </a:t>
+            </a:r>
+            <a:r>
+              <a:rPr lang="en-US" b="1" dirty="0">
+                <a:solidFill>
+                  <a:srgbClr val="0E0E0E"/>
+                </a:solidFill>
+                <a:effectLst/>
+                <a:latin typeface=".AppleSystemUIFont"/>
+              </a:rPr>
+              <a:t>Application-Specific Decision</a:t>
+            </a:r>
+            <a:r>
+              <a:rPr lang="en-US" dirty="0">
+                <a:solidFill>
+                  <a:srgbClr val="0E0E0E"/>
+                </a:solidFill>
+                <a:effectLst/>
+                <a:latin typeface=".AppleSystemUIFont"/>
+              </a:rPr>
+              <a:t>:</a:t>
+            </a:r>
+          </a:p>
+          <a:p>
+            <a:pPr lvl="1">
+              <a:spcBef>
+                <a:spcPts val="900"/>
+              </a:spcBef>
+            </a:pPr>
+            <a:r>
+              <a:rPr lang="en-US" dirty="0">
+                <a:solidFill>
+                  <a:srgbClr val="0E0E0E"/>
+                </a:solidFill>
+                <a:effectLst/>
+                <a:latin typeface=".AppleSystemUIFont"/>
+              </a:rPr>
+              <a:t>Depending on the use case, you might prioritize precision (e.g., to minimize false alarms in fraud detection systems where false positives are costly) or recall (e.g., to ensure all fraudulent transactions are flagged).</a:t>
+            </a:r>
+          </a:p>
+          <a:p>
+            <a:endParaRPr lang="en-US" dirty="0"/>
+          </a:p>
+        </p:txBody>
+      </p:sp>
+      <p:sp>
+        <p:nvSpPr>
+          <p:cNvPr id="4" name="Slide Number Placeholder 3"/>
+          <p:cNvSpPr>
+            <a:spLocks noGrp="1"/>
+          </p:cNvSpPr>
+          <p:nvPr>
+            <p:ph type="sldNum" sz="quarter" idx="5"/>
+          </p:nvPr>
+        </p:nvSpPr>
+        <p:spPr/>
+        <p:txBody>
+          <a:bodyPr/>
+          <a:lstStyle/>
+          <a:p>
+            <a:fld id="{492B2B1A-E91C-F249-97E5-61AB060BBE8D}" type="slidenum">
+              <a:rPr lang="en-US" smtClean="0"/>
+              <a:t>5</a:t>
+            </a:fld>
+            <a:endParaRPr lang="en-US"/>
+          </a:p>
+        </p:txBody>
+      </p:sp>
+    </p:spTree>
+    <p:extLst>
+      <p:ext uri="{BB962C8B-B14F-4D97-AF65-F5344CB8AC3E}">
+        <p14:creationId xmlns:p14="http://schemas.microsoft.com/office/powerpoint/2010/main" val="367440768"/>
+      </p:ext>
+    </p:extLst>
+  </p:cSld>
+  <p:clrMapOvr>
+    <a:masterClrMapping/>
+  </p:clrMapOvr>
+</p:notes>
+</file>
+
+<file path=ppt/notesSlides/notesSlide6.xml><?xml version="1.0" encoding="utf-8"?>
+<p:notes xmlns:a="http://schemas.openxmlformats.org/drawingml/2006/main" xmlns:r="http://schemas.openxmlformats.org/officeDocument/2006/relationships" xmlns:p="http://schemas.openxmlformats.org/presentationml/2006/main">
+  <p:cSld>
+    <p:spTree>
+      <p:nvGrpSpPr>
+        <p:cNvPr id="1" name=""/>
+        <p:cNvGrpSpPr/>
+        <p:nvPr/>
+      </p:nvGrpSpPr>
+      <p:grpSpPr>
+        <a:xfrm>
+          <a:off x="0" y="0"/>
+          <a:ext cx="0" cy="0"/>
+          <a:chOff x="0" y="0"/>
+          <a:chExt cx="0" cy="0"/>
+        </a:xfrm>
+      </p:grpSpPr>
+      <p:sp>
+        <p:nvSpPr>
+          <p:cNvPr id="2" name="Slide Image Placeholder 1"/>
+          <p:cNvSpPr>
+            <a:spLocks noGrp="1" noRot="1" noChangeAspect="1"/>
+          </p:cNvSpPr>
+          <p:nvPr>
+            <p:ph type="sldImg"/>
+          </p:nvPr>
+        </p:nvSpPr>
+        <p:spPr/>
+      </p:sp>
+      <p:sp>
+        <p:nvSpPr>
+          <p:cNvPr id="3" name="Notes Placeholder 2"/>
+          <p:cNvSpPr>
+            <a:spLocks noGrp="1"/>
+          </p:cNvSpPr>
+          <p:nvPr>
+            <p:ph type="body" idx="1"/>
+          </p:nvPr>
+        </p:nvSpPr>
+        <p:spPr/>
+        <p:txBody>
+          <a:bodyPr/>
+          <a:lstStyle/>
+          <a:p>
+            <a:endParaRPr lang="en-US" dirty="0"/>
+          </a:p>
+        </p:txBody>
+      </p:sp>
+      <p:sp>
+        <p:nvSpPr>
+          <p:cNvPr id="4" name="Slide Number Placeholder 3"/>
+          <p:cNvSpPr>
+            <a:spLocks noGrp="1"/>
+          </p:cNvSpPr>
+          <p:nvPr>
+            <p:ph type="sldNum" sz="quarter" idx="5"/>
+          </p:nvPr>
+        </p:nvSpPr>
+        <p:spPr/>
+        <p:txBody>
+          <a:bodyPr/>
+          <a:lstStyle/>
+          <a:p>
+            <a:fld id="{492B2B1A-E91C-F249-97E5-61AB060BBE8D}" type="slidenum">
+              <a:rPr lang="en-US" smtClean="0"/>
+              <a:t>6</a:t>
+            </a:fld>
+            <a:endParaRPr lang="en-US"/>
+          </a:p>
+        </p:txBody>
+      </p:sp>
+    </p:spTree>
+    <p:extLst>
+      <p:ext uri="{BB962C8B-B14F-4D97-AF65-F5344CB8AC3E}">
+        <p14:creationId xmlns:p14="http://schemas.microsoft.com/office/powerpoint/2010/main" val="2014541794"/>
+      </p:ext>
+    </p:extLst>
+  </p:cSld>
+  <p:clrMapOvr>
+    <a:masterClrMapping/>
+  </p:clrMapOvr>
+</p:notes>
+</file>
+
 <file path=ppt/slideLayouts/slideLayout1.xml><?xml version="1.0" encoding="utf-8"?>
 <p:sldLayout xmlns:a="http://schemas.openxmlformats.org/drawingml/2006/main" xmlns:r="http://schemas.openxmlformats.org/officeDocument/2006/relationships" xmlns:p="http://schemas.openxmlformats.org/presentationml/2006/main" showMasterSp="0" type="title" preserve="1">
   <p:cSld name="Title Slide">
@@ -886,7 +1727,7 @@
           <a:p>
             <a:fld id="{9184DA70-C731-4C70-880D-CCD4705E623C}" type="datetime1">
               <a:rPr lang="en-US" smtClean="0"/>
-              <a:t>1/7/25</a:t>
+              <a:t>1/9/25</a:t>
             </a:fld>
             <a:endParaRPr lang="en-US" dirty="0"/>
           </a:p>
@@ -1074,7 +1915,7 @@
           <a:p>
             <a:fld id="{B612A279-0833-481D-8C56-F67FD0AC6C50}" type="datetime1">
               <a:rPr lang="en-US" smtClean="0"/>
-              <a:t>1/7/25</a:t>
+              <a:t>1/9/25</a:t>
             </a:fld>
             <a:endParaRPr lang="en-US" dirty="0"/>
           </a:p>
@@ -1316,7 +2157,7 @@
           <a:p>
             <a:fld id="{6587DA83-5663-4C9C-B9AA-0B40A3DAFF81}" type="datetime1">
               <a:rPr lang="en-US" smtClean="0"/>
-              <a:t>1/7/25</a:t>
+              <a:t>1/9/25</a:t>
             </a:fld>
             <a:endParaRPr lang="en-US" dirty="0"/>
           </a:p>
@@ -1504,7 +2345,7 @@
           <a:p>
             <a:fld id="{4BE1D723-8F53-4F53-90B0-1982A396982E}" type="datetime1">
               <a:rPr lang="en-US" smtClean="0"/>
-              <a:t>1/7/25</a:t>
+              <a:t>1/9/25</a:t>
             </a:fld>
             <a:endParaRPr lang="en-US" dirty="0"/>
           </a:p>
@@ -1877,7 +2718,7 @@
           <a:p>
             <a:fld id="{97669AF7-7BEB-44E4-9852-375E34362B5B}" type="datetime1">
               <a:rPr lang="en-US" smtClean="0"/>
-              <a:t>1/7/25</a:t>
+              <a:t>1/9/25</a:t>
             </a:fld>
             <a:endParaRPr lang="en-US" dirty="0"/>
           </a:p>
@@ -2132,7 +2973,7 @@
           <a:p>
             <a:fld id="{BAAAC38D-0552-4C82-B593-E6124DFADBE2}" type="datetime1">
               <a:rPr lang="en-US" smtClean="0"/>
-              <a:t>1/7/25</a:t>
+              <a:t>1/9/25</a:t>
             </a:fld>
             <a:endParaRPr lang="en-US" dirty="0"/>
           </a:p>
@@ -2529,7 +3370,7 @@
           <a:p>
             <a:fld id="{D9DF0F1C-5577-4ACB-BB62-DF8F3C494C7E}" type="datetime1">
               <a:rPr lang="en-US" smtClean="0"/>
-              <a:t>1/7/25</a:t>
+              <a:t>1/9/25</a:t>
             </a:fld>
             <a:endParaRPr lang="en-US" dirty="0"/>
           </a:p>
@@ -2665,7 +3506,7 @@
           <a:p>
             <a:fld id="{1775B394-D9F9-4F0C-B15D-605F45CB9E9F}" type="datetime1">
               <a:rPr lang="en-US" smtClean="0"/>
-              <a:t>1/7/25</a:t>
+              <a:t>1/9/25</a:t>
             </a:fld>
             <a:endParaRPr lang="en-US" dirty="0"/>
           </a:p>
@@ -2822,7 +3663,7 @@
           <a:p>
             <a:fld id="{39667345-2558-425A-8533-9BFDBCE15005}" type="datetime1">
               <a:rPr lang="en-US" smtClean="0"/>
-              <a:t>1/7/25</a:t>
+              <a:t>1/9/25</a:t>
             </a:fld>
             <a:endParaRPr lang="en-US" dirty="0"/>
           </a:p>
@@ -3151,7 +3992,7 @@
           <a:p>
             <a:fld id="{92BEA474-078D-4E9B-9B14-09A87B19DC46}" type="datetime1">
               <a:rPr lang="en-US" smtClean="0"/>
-              <a:t>1/7/25</a:t>
+              <a:t>1/9/25</a:t>
             </a:fld>
             <a:endParaRPr lang="en-US" dirty="0"/>
           </a:p>
@@ -3501,7 +4342,7 @@
           <a:p>
             <a:fld id="{4907D986-8816-4272-A432-0437A28A9828}" type="datetime1">
               <a:rPr lang="en-US" smtClean="0"/>
-              <a:t>1/7/25</a:t>
+              <a:t>1/9/25</a:t>
             </a:fld>
             <a:endParaRPr lang="en-US" dirty="0"/>
           </a:p>
@@ -3762,7 +4603,7 @@
           <a:p>
             <a:fld id="{62D6E202-B606-4609-B914-27C9371A1F6D}" type="datetime1">
               <a:rPr lang="en-US" smtClean="0"/>
-              <a:t>1/7/25</a:t>
+              <a:t>1/9/25</a:t>
             </a:fld>
             <a:endParaRPr lang="en-US" dirty="0"/>
           </a:p>
@@ -5086,7 +5927,7 @@
           <p:cNvPr id="2" name="Title 1">
             <a:extLst>
               <a:ext uri="{FF2B5EF4-FFF2-40B4-BE49-F238E27FC236}">
-                <a16:creationId xmlns:a16="http://schemas.microsoft.com/office/drawing/2014/main" id="{DED2F883-E24F-6485-7D50-518C6285500B}"/>
+                <a16:creationId xmlns:a16="http://schemas.microsoft.com/office/drawing/2014/main" id="{81340BC2-E845-0BA8-B46B-6ED98BE6DDF0}"/>
               </a:ext>
             </a:extLst>
           </p:cNvPr>
@@ -5104,44 +5945,144 @@
           <a:p>
             <a:r>
               <a:rPr lang="en-US" dirty="0"/>
-              <a:t>Model Architecture</a:t>
+              <a:t>Model Selection: Logistic Regression versus Random Forest with SMOTE</a:t>
             </a:r>
           </a:p>
         </p:txBody>
       </p:sp>
       <p:pic>
         <p:nvPicPr>
-          <p:cNvPr id="5" name="Content Placeholder 4" descr="A screen shot of a computer program&#10;&#10;Description automatically generated">
+          <p:cNvPr id="4" name="Content Placeholder 4" descr="A screenshot of a computer&#10;&#10;Description automatically generated">
             <a:extLst>
               <a:ext uri="{FF2B5EF4-FFF2-40B4-BE49-F238E27FC236}">
-                <a16:creationId xmlns:a16="http://schemas.microsoft.com/office/drawing/2014/main" id="{0F77C835-C6AB-4499-44E8-2EA219B5757A}"/>
+                <a16:creationId xmlns:a16="http://schemas.microsoft.com/office/drawing/2014/main" id="{05543EE0-ABE5-291F-D541-C59B6CD45DF4}"/>
               </a:ext>
             </a:extLst>
           </p:cNvPr>
           <p:cNvPicPr>
-            <a:picLocks noGrp="1" noChangeAspect="1"/>
+            <a:picLocks noChangeAspect="1"/>
           </p:cNvPicPr>
-          <p:nvPr>
-            <p:ph idx="1"/>
-          </p:nvPr>
+          <p:nvPr/>
         </p:nvPicPr>
         <p:blipFill>
-          <a:blip r:embed="rId2"/>
+          <a:blip r:embed="rId3"/>
           <a:stretch>
             <a:fillRect/>
           </a:stretch>
         </p:blipFill>
         <p:spPr>
           <a:xfrm>
-            <a:off x="3133026" y="2108200"/>
-            <a:ext cx="5986273" cy="3760788"/>
-          </a:xfrm>
+            <a:off x="610889" y="2848255"/>
+            <a:ext cx="5140758" cy="2776009"/>
+          </a:xfrm>
+          <a:prstGeom prst="rect">
+            <a:avLst/>
+          </a:prstGeom>
         </p:spPr>
       </p:pic>
+      <p:pic>
+        <p:nvPicPr>
+          <p:cNvPr id="6" name="Picture 5" descr="A number of numbers on a white background&#10;&#10;Description automatically generated">
+            <a:extLst>
+              <a:ext uri="{FF2B5EF4-FFF2-40B4-BE49-F238E27FC236}">
+                <a16:creationId xmlns:a16="http://schemas.microsoft.com/office/drawing/2014/main" id="{B7DC6A85-A591-5E43-8D2A-78A4E7107C68}"/>
+              </a:ext>
+            </a:extLst>
+          </p:cNvPr>
+          <p:cNvPicPr>
+            <a:picLocks noChangeAspect="1"/>
+          </p:cNvPicPr>
+          <p:nvPr/>
+        </p:nvPicPr>
+        <p:blipFill>
+          <a:blip r:embed="rId4"/>
+          <a:srcRect t="19526"/>
+          <a:stretch/>
+        </p:blipFill>
+        <p:spPr>
+          <a:xfrm>
+            <a:off x="5751647" y="2905432"/>
+            <a:ext cx="5698664" cy="1943015"/>
+          </a:xfrm>
+          <a:prstGeom prst="rect">
+            <a:avLst/>
+          </a:prstGeom>
+        </p:spPr>
+      </p:pic>
+      <p:sp>
+        <p:nvSpPr>
+          <p:cNvPr id="7" name="TextBox 6">
+            <a:extLst>
+              <a:ext uri="{FF2B5EF4-FFF2-40B4-BE49-F238E27FC236}">
+                <a16:creationId xmlns:a16="http://schemas.microsoft.com/office/drawing/2014/main" id="{29D58331-223F-D3DD-F2DB-50F011BB5DE4}"/>
+              </a:ext>
+            </a:extLst>
+          </p:cNvPr>
+          <p:cNvSpPr txBox="1"/>
+          <p:nvPr/>
+        </p:nvSpPr>
+        <p:spPr>
+          <a:xfrm>
+            <a:off x="610889" y="2276272"/>
+            <a:ext cx="4272388" cy="369332"/>
+          </a:xfrm>
+          <a:prstGeom prst="rect">
+            <a:avLst/>
+          </a:prstGeom>
+          <a:noFill/>
+        </p:spPr>
+        <p:txBody>
+          <a:bodyPr wrap="square" rtlCol="0">
+            <a:spAutoFit/>
+          </a:bodyPr>
+          <a:lstStyle/>
+          <a:p>
+            <a:r>
+              <a:rPr lang="en-US" dirty="0"/>
+              <a:t>Logistic Regression Model</a:t>
+            </a:r>
+          </a:p>
+        </p:txBody>
+      </p:sp>
+      <p:sp>
+        <p:nvSpPr>
+          <p:cNvPr id="8" name="TextBox 7">
+            <a:extLst>
+              <a:ext uri="{FF2B5EF4-FFF2-40B4-BE49-F238E27FC236}">
+                <a16:creationId xmlns:a16="http://schemas.microsoft.com/office/drawing/2014/main" id="{C50156EF-ECC2-4D34-1D8E-2FA1F9395814}"/>
+              </a:ext>
+            </a:extLst>
+          </p:cNvPr>
+          <p:cNvSpPr txBox="1"/>
+          <p:nvPr/>
+        </p:nvSpPr>
+        <p:spPr>
+          <a:xfrm>
+            <a:off x="5751647" y="2276272"/>
+            <a:ext cx="4272388" cy="369332"/>
+          </a:xfrm>
+          <a:prstGeom prst="rect">
+            <a:avLst/>
+          </a:prstGeom>
+          <a:noFill/>
+        </p:spPr>
+        <p:txBody>
+          <a:bodyPr wrap="square" rtlCol="0">
+            <a:spAutoFit/>
+          </a:bodyPr>
+          <a:lstStyle/>
+          <a:p>
+            <a:r>
+              <a:rPr lang="en-US" dirty="0"/>
+              <a:t>Random Forest with SMOTE Model</a:t>
+            </a:r>
+          </a:p>
+        </p:txBody>
+      </p:sp>
     </p:spTree>
     <p:extLst>
       <p:ext uri="{BB962C8B-B14F-4D97-AF65-F5344CB8AC3E}">
-        <p14:creationId xmlns:p14="http://schemas.microsoft.com/office/powerpoint/2010/main" val="4110778545"/>
+        <p14:creationId xmlns:p14="http://schemas.microsoft.com/office/powerpoint/2010/main" val="2059288058"/>
       </p:ext>
     </p:extLst>
   </p:cSld>
@@ -5173,7 +6114,7 @@
           <p:cNvPr id="2" name="Title 1">
             <a:extLst>
               <a:ext uri="{FF2B5EF4-FFF2-40B4-BE49-F238E27FC236}">
-                <a16:creationId xmlns:a16="http://schemas.microsoft.com/office/drawing/2014/main" id="{F29DDCD8-7B78-5B88-6983-48FEEDF41D49}"/>
+                <a16:creationId xmlns:a16="http://schemas.microsoft.com/office/drawing/2014/main" id="{05DA0662-B792-A8C9-A330-F5B983810CCD}"/>
               </a:ext>
             </a:extLst>
           </p:cNvPr>
@@ -5191,45 +6132,22 @@
           <a:p>
             <a:r>
               <a:rPr lang="en-US" dirty="0"/>
-              <a:t>Results Visualization</a:t>
-            </a:r>
+              <a:t>Model Selection: Random Forest with SMOTE versus </a:t>
+            </a:r>
+            <a:r>
+              <a:rPr lang="en-US" dirty="0" err="1"/>
+              <a:t>XGBoost</a:t>
+            </a:r>
+            <a:endParaRPr lang="en-US" dirty="0"/>
           </a:p>
         </p:txBody>
       </p:sp>
       <p:pic>
         <p:nvPicPr>
-          <p:cNvPr id="5" name="Content Placeholder 4" descr="A graph with a line&#10;&#10;Description automatically generated">
+          <p:cNvPr id="6" name="Picture 5" descr="A number of numbers on a white background&#10;&#10;Description automatically generated">
             <a:extLst>
               <a:ext uri="{FF2B5EF4-FFF2-40B4-BE49-F238E27FC236}">
-                <a16:creationId xmlns:a16="http://schemas.microsoft.com/office/drawing/2014/main" id="{BE3535E3-C90C-88A0-0D94-AB9B803BB5E6}"/>
-              </a:ext>
-            </a:extLst>
-          </p:cNvPr>
-          <p:cNvPicPr>
-            <a:picLocks noGrp="1" noChangeAspect="1"/>
-          </p:cNvPicPr>
-          <p:nvPr>
-            <p:ph idx="1"/>
-          </p:nvPr>
-        </p:nvPicPr>
-        <p:blipFill>
-          <a:blip r:embed="rId2"/>
-          <a:srcRect l="917" t="1313"/>
-          <a:stretch/>
-        </p:blipFill>
-        <p:spPr>
-          <a:xfrm>
-            <a:off x="890156" y="2455333"/>
-            <a:ext cx="5236324" cy="3127059"/>
-          </a:xfrm>
-        </p:spPr>
-      </p:pic>
-      <p:pic>
-        <p:nvPicPr>
-          <p:cNvPr id="7" name="Picture 6" descr="A graph with a line&#10;&#10;Description automatically generated">
-            <a:extLst>
-              <a:ext uri="{FF2B5EF4-FFF2-40B4-BE49-F238E27FC236}">
-                <a16:creationId xmlns:a16="http://schemas.microsoft.com/office/drawing/2014/main" id="{360F2760-92FD-7499-49DE-ACE2DF4829C8}"/>
+                <a16:creationId xmlns:a16="http://schemas.microsoft.com/office/drawing/2014/main" id="{979FEDD6-86CE-61DB-5F53-BB3850E13670}"/>
               </a:ext>
             </a:extLst>
           </p:cNvPr>
@@ -5240,23 +6158,127 @@
         </p:nvPicPr>
         <p:blipFill>
           <a:blip r:embed="rId3"/>
-          <a:srcRect l="-1" t="3183" r="848"/>
+          <a:srcRect t="19526"/>
           <a:stretch/>
         </p:blipFill>
         <p:spPr>
           <a:xfrm>
-            <a:off x="6333066" y="2501900"/>
-            <a:ext cx="5236324" cy="3067792"/>
+            <a:off x="769703" y="2928526"/>
+            <a:ext cx="5698664" cy="1943015"/>
           </a:xfrm>
           <a:prstGeom prst="rect">
             <a:avLst/>
           </a:prstGeom>
         </p:spPr>
       </p:pic>
+      <p:sp>
+        <p:nvSpPr>
+          <p:cNvPr id="7" name="TextBox 6">
+            <a:extLst>
+              <a:ext uri="{FF2B5EF4-FFF2-40B4-BE49-F238E27FC236}">
+                <a16:creationId xmlns:a16="http://schemas.microsoft.com/office/drawing/2014/main" id="{8975531A-1045-057C-7132-3F9A9DFCE2FA}"/>
+              </a:ext>
+            </a:extLst>
+          </p:cNvPr>
+          <p:cNvSpPr txBox="1"/>
+          <p:nvPr/>
+        </p:nvSpPr>
+        <p:spPr>
+          <a:xfrm>
+            <a:off x="769703" y="2325745"/>
+            <a:ext cx="4272388" cy="369332"/>
+          </a:xfrm>
+          <a:prstGeom prst="rect">
+            <a:avLst/>
+          </a:prstGeom>
+          <a:noFill/>
+        </p:spPr>
+        <p:txBody>
+          <a:bodyPr wrap="square" rtlCol="0">
+            <a:spAutoFit/>
+          </a:bodyPr>
+          <a:lstStyle/>
+          <a:p>
+            <a:r>
+              <a:rPr lang="en-US" dirty="0"/>
+              <a:t>Random Forest with SMOTE Model</a:t>
+            </a:r>
+          </a:p>
+        </p:txBody>
+      </p:sp>
+      <p:pic>
+        <p:nvPicPr>
+          <p:cNvPr id="11" name="Picture 10" descr="A screenshot of a computer&#10;&#10;Description automatically generated">
+            <a:extLst>
+              <a:ext uri="{FF2B5EF4-FFF2-40B4-BE49-F238E27FC236}">
+                <a16:creationId xmlns:a16="http://schemas.microsoft.com/office/drawing/2014/main" id="{5A9F481A-69AC-F03B-60E2-69F996CE4E9A}"/>
+              </a:ext>
+            </a:extLst>
+          </p:cNvPr>
+          <p:cNvPicPr>
+            <a:picLocks noChangeAspect="1"/>
+          </p:cNvPicPr>
+          <p:nvPr/>
+        </p:nvPicPr>
+        <p:blipFill>
+          <a:blip r:embed="rId4"/>
+          <a:stretch>
+            <a:fillRect/>
+          </a:stretch>
+        </p:blipFill>
+        <p:spPr>
+          <a:xfrm>
+            <a:off x="6623957" y="2854054"/>
+            <a:ext cx="5410200" cy="1968500"/>
+          </a:xfrm>
+          <a:prstGeom prst="rect">
+            <a:avLst/>
+          </a:prstGeom>
+        </p:spPr>
+      </p:pic>
+      <p:sp>
+        <p:nvSpPr>
+          <p:cNvPr id="12" name="TextBox 11">
+            <a:extLst>
+              <a:ext uri="{FF2B5EF4-FFF2-40B4-BE49-F238E27FC236}">
+                <a16:creationId xmlns:a16="http://schemas.microsoft.com/office/drawing/2014/main" id="{66612E7C-ECAD-1ED2-1015-B75ECD72C6FA}"/>
+              </a:ext>
+            </a:extLst>
+          </p:cNvPr>
+          <p:cNvSpPr txBox="1"/>
+          <p:nvPr/>
+        </p:nvSpPr>
+        <p:spPr>
+          <a:xfrm>
+            <a:off x="6623957" y="2325745"/>
+            <a:ext cx="4272388" cy="369332"/>
+          </a:xfrm>
+          <a:prstGeom prst="rect">
+            <a:avLst/>
+          </a:prstGeom>
+          <a:noFill/>
+        </p:spPr>
+        <p:txBody>
+          <a:bodyPr wrap="square" rtlCol="0">
+            <a:spAutoFit/>
+          </a:bodyPr>
+          <a:lstStyle/>
+          <a:p>
+            <a:r>
+              <a:rPr lang="en-US" dirty="0" err="1"/>
+              <a:t>XGBoost</a:t>
+            </a:r>
+            <a:r>
+              <a:rPr lang="en-US" dirty="0"/>
+              <a:t> Model</a:t>
+            </a:r>
+          </a:p>
+        </p:txBody>
+      </p:sp>
     </p:spTree>
     <p:extLst>
       <p:ext uri="{BB962C8B-B14F-4D97-AF65-F5344CB8AC3E}">
-        <p14:creationId xmlns:p14="http://schemas.microsoft.com/office/powerpoint/2010/main" val="2343250941"/>
+        <p14:creationId xmlns:p14="http://schemas.microsoft.com/office/powerpoint/2010/main" val="188649"/>
       </p:ext>
     </p:extLst>
   </p:cSld>
@@ -5291,12 +6313,12 @@
           <a:chExt cx="0" cy="0"/>
         </a:xfrm>
       </p:grpSpPr>
-      <p:sp useBgFill="1">
-        <p:nvSpPr>
-          <p:cNvPr id="19" name="Rectangle 18">
+      <p:sp>
+        <p:nvSpPr>
+          <p:cNvPr id="17" name="Rectangle 16">
             <a:extLst>
               <a:ext uri="{FF2B5EF4-FFF2-40B4-BE49-F238E27FC236}">
-                <a16:creationId xmlns:a16="http://schemas.microsoft.com/office/drawing/2014/main" id="{0AB6E427-3F73-4C06-A5D5-AE52C3883B50}"/>
+                <a16:creationId xmlns:a16="http://schemas.microsoft.com/office/drawing/2014/main" id="{39E3965E-AC41-4711-9D10-E25ABB132D86}"/>
               </a:ext>
               <a:ext uri="{C183D7F6-B498-43B3-948B-1728B52AA6E4}">
                 <adec:decorative xmlns:adec="http://schemas.microsoft.com/office/drawing/2017/decorative" val="1"/>
@@ -5316,74 +6338,14 @@
         </p:nvSpPr>
         <p:spPr>
           <a:xfrm>
-            <a:off x="5685" y="0"/>
-            <a:ext cx="12186315" cy="6858000"/>
-          </a:xfrm>
-          <a:prstGeom prst="rect">
-            <a:avLst/>
-          </a:prstGeom>
-          <a:ln>
-            <a:noFill/>
-          </a:ln>
-        </p:spPr>
-        <p:style>
-          <a:lnRef idx="2">
-            <a:schemeClr val="accent6">
-              <a:shade val="50000"/>
-            </a:schemeClr>
-          </a:lnRef>
-          <a:fillRef idx="1001">
-            <a:schemeClr val="lt1"/>
-          </a:fillRef>
-          <a:effectRef idx="0">
-            <a:schemeClr val="accent6"/>
-          </a:effectRef>
-          <a:fontRef idx="minor">
-            <a:schemeClr val="lt1"/>
-          </a:fontRef>
-        </p:style>
-        <p:txBody>
-          <a:bodyPr rtlCol="0" anchor="ctr"/>
-          <a:lstStyle/>
-          <a:p>
-            <a:pPr algn="ctr"/>
-            <a:endParaRPr lang="en-US"/>
-          </a:p>
-        </p:txBody>
-      </p:sp>
-      <p:sp>
-        <p:nvSpPr>
-          <p:cNvPr id="21" name="Rectangle 20">
-            <a:extLst>
-              <a:ext uri="{FF2B5EF4-FFF2-40B4-BE49-F238E27FC236}">
-                <a16:creationId xmlns:a16="http://schemas.microsoft.com/office/drawing/2014/main" id="{D8C9BDAA-0390-4B39-9B5C-BC95E5120DA4}"/>
-              </a:ext>
-              <a:ext uri="{C183D7F6-B498-43B3-948B-1728B52AA6E4}">
-                <adec:decorative xmlns:adec="http://schemas.microsoft.com/office/drawing/2017/decorative" val="1"/>
-              </a:ext>
-            </a:extLst>
-          </p:cNvPr>
-          <p:cNvSpPr>
-            <a:spLocks noGrp="1" noRot="1" noChangeAspect="1" noMove="1" noResize="1" noEditPoints="1" noAdjustHandles="1" noChangeArrowheads="1" noChangeShapeType="1" noTextEdit="1"/>
-          </p:cNvSpPr>
-          <p:nvPr>
-            <p:extLst>
-              <p:ext uri="{386F3935-93C4-4BCD-93E2-E3B085C9AB24}">
-                <p16:designElem xmlns:p16="http://schemas.microsoft.com/office/powerpoint/2015/main" val="1"/>
-              </p:ext>
-            </p:extLst>
-          </p:nvPr>
-        </p:nvSpPr>
-        <p:spPr>
-          <a:xfrm>
-            <a:off x="16" y="0"/>
-            <a:ext cx="4059919" cy="6858000"/>
+            <a:off x="3175" y="6400800"/>
+            <a:ext cx="12188825" cy="457200"/>
           </a:xfrm>
           <a:prstGeom prst="rect">
             <a:avLst/>
           </a:prstGeom>
           <a:solidFill>
-            <a:srgbClr val="32B67D"/>
+            <a:srgbClr val="262626"/>
           </a:solidFill>
           <a:ln>
             <a:noFill/>
@@ -5413,51 +6375,12 @@
           </a:p>
         </p:txBody>
       </p:sp>
-      <p:sp>
-        <p:nvSpPr>
-          <p:cNvPr id="2" name="Title 1">
+      <p:cxnSp>
+        <p:nvCxnSpPr>
+          <p:cNvPr id="19" name="Straight Connector 18">
             <a:extLst>
               <a:ext uri="{FF2B5EF4-FFF2-40B4-BE49-F238E27FC236}">
-                <a16:creationId xmlns:a16="http://schemas.microsoft.com/office/drawing/2014/main" id="{FD06C7F7-4842-D5C4-3D84-33752668A518}"/>
-              </a:ext>
-            </a:extLst>
-          </p:cNvPr>
-          <p:cNvSpPr>
-            <a:spLocks noGrp="1"/>
-          </p:cNvSpPr>
-          <p:nvPr>
-            <p:ph type="title"/>
-          </p:nvPr>
-        </p:nvSpPr>
-        <p:spPr>
-          <a:xfrm>
-            <a:off x="492370" y="516836"/>
-            <a:ext cx="3084844" cy="1961086"/>
-          </a:xfrm>
-        </p:spPr>
-        <p:txBody>
-          <a:bodyPr vert="horz" lIns="91440" tIns="45720" rIns="91440" bIns="45720" rtlCol="0" anchor="b">
-            <a:normAutofit/>
-          </a:bodyPr>
-          <a:lstStyle/>
-          <a:p>
-            <a:r>
-              <a:rPr lang="en-US" sz="2500" dirty="0">
-                <a:solidFill>
-                  <a:srgbClr val="FFFFFF"/>
-                </a:solidFill>
-              </a:rPr>
-              <a:t>Precision, Recall, and F1-Score Analysis for Class 0 (Non-Fraudulent Transactions)</a:t>
-            </a:r>
-          </a:p>
-        </p:txBody>
-      </p:sp>
-      <p:cxnSp>
-        <p:nvCxnSpPr>
-          <p:cNvPr id="23" name="Straight Connector 22">
-            <a:extLst>
-              <a:ext uri="{FF2B5EF4-FFF2-40B4-BE49-F238E27FC236}">
-                <a16:creationId xmlns:a16="http://schemas.microsoft.com/office/drawing/2014/main" id="{E04A321A-A039-4720-87B4-66A4210E0D57}"/>
+                <a16:creationId xmlns:a16="http://schemas.microsoft.com/office/drawing/2014/main" id="{1F5DC8C3-BA5F-4EED-BB9A-A14272BD82A1}"/>
               </a:ext>
               <a:ext uri="{C183D7F6-B498-43B3-948B-1728B52AA6E4}">
                 <adec:decorative xmlns:adec="http://schemas.microsoft.com/office/drawing/2017/decorative" val="1"/>
@@ -5477,15 +6400,18 @@
         </p:nvCxnSpPr>
         <p:spPr>
           <a:xfrm>
-            <a:off x="571752" y="2638787"/>
-            <a:ext cx="2743200" cy="0"/>
+            <a:off x="1207658" y="4474741"/>
+            <a:ext cx="9875520" cy="0"/>
           </a:xfrm>
           <a:prstGeom prst="line">
             <a:avLst/>
           </a:prstGeom>
-          <a:ln w="19050">
+          <a:ln w="12700">
             <a:solidFill>
-              <a:schemeClr val="accent1"/>
+              <a:schemeClr val="tx1">
+                <a:lumMod val="75000"/>
+                <a:lumOff val="25000"/>
+              </a:schemeClr>
             </a:solidFill>
           </a:ln>
         </p:spPr>
@@ -5504,279 +6430,114 @@
           </a:fontRef>
         </p:style>
       </p:cxnSp>
-      <p:sp>
-        <p:nvSpPr>
-          <p:cNvPr id="7" name="TextBox 6">
+      <p:sp useBgFill="1">
+        <p:nvSpPr>
+          <p:cNvPr id="21" name="Rectangle 20">
             <a:extLst>
               <a:ext uri="{FF2B5EF4-FFF2-40B4-BE49-F238E27FC236}">
-                <a16:creationId xmlns:a16="http://schemas.microsoft.com/office/drawing/2014/main" id="{72D0414C-6993-1081-DBCE-A81867A2804C}"/>
+                <a16:creationId xmlns:a16="http://schemas.microsoft.com/office/drawing/2014/main" id="{33428ACC-71EC-4171-9527-10983BA6B41D}"/>
+              </a:ext>
+              <a:ext uri="{C183D7F6-B498-43B3-948B-1728B52AA6E4}">
+                <adec:decorative xmlns:adec="http://schemas.microsoft.com/office/drawing/2017/decorative" val="1"/>
               </a:ext>
             </a:extLst>
           </p:cNvPr>
-          <p:cNvSpPr txBox="1"/>
-          <p:nvPr/>
-        </p:nvSpPr>
-        <p:spPr>
-          <a:xfrm>
-            <a:off x="571752" y="2799654"/>
-            <a:ext cx="3005462" cy="3189665"/>
+          <p:cNvSpPr>
+            <a:spLocks noGrp="1" noRot="1" noChangeAspect="1" noMove="1" noResize="1" noEditPoints="1" noAdjustHandles="1" noChangeArrowheads="1" noChangeShapeType="1" noTextEdit="1"/>
+          </p:cNvSpPr>
+          <p:nvPr>
+            <p:extLst>
+              <p:ext uri="{386F3935-93C4-4BCD-93E2-E3B085C9AB24}">
+                <p16:designElem xmlns:p16="http://schemas.microsoft.com/office/powerpoint/2015/main" val="1"/>
+              </p:ext>
+            </p:extLst>
+          </p:nvPr>
+        </p:nvSpPr>
+        <p:spPr>
+          <a:xfrm>
+            <a:off x="0" y="0"/>
+            <a:ext cx="12192001" cy="6858000"/>
           </a:xfrm>
           <a:prstGeom prst="rect">
             <a:avLst/>
           </a:prstGeom>
-        </p:spPr>
-        <p:txBody>
-          <a:bodyPr vert="horz" lIns="0" tIns="45720" rIns="0" bIns="45720" rtlCol="0">
-            <a:noAutofit/>
+          <a:ln>
+            <a:noFill/>
+          </a:ln>
+        </p:spPr>
+        <p:style>
+          <a:lnRef idx="2">
+            <a:schemeClr val="accent1">
+              <a:shade val="50000"/>
+            </a:schemeClr>
+          </a:lnRef>
+          <a:fillRef idx="1">
+            <a:schemeClr val="accent1"/>
+          </a:fillRef>
+          <a:effectRef idx="0">
+            <a:schemeClr val="accent1"/>
+          </a:effectRef>
+          <a:fontRef idx="minor">
+            <a:schemeClr val="lt1"/>
+          </a:fontRef>
+        </p:style>
+        <p:txBody>
+          <a:bodyPr rtlCol="0" anchor="ctr"/>
+          <a:lstStyle/>
+          <a:p>
+            <a:pPr algn="ctr"/>
+            <a:endParaRPr lang="en-US"/>
+          </a:p>
+        </p:txBody>
+      </p:sp>
+      <p:sp>
+        <p:nvSpPr>
+          <p:cNvPr id="2" name="Title 1">
+            <a:extLst>
+              <a:ext uri="{FF2B5EF4-FFF2-40B4-BE49-F238E27FC236}">
+                <a16:creationId xmlns:a16="http://schemas.microsoft.com/office/drawing/2014/main" id="{F29DDCD8-7B78-5B88-6983-48FEEDF41D49}"/>
+              </a:ext>
+            </a:extLst>
+          </p:cNvPr>
+          <p:cNvSpPr>
+            <a:spLocks noGrp="1"/>
+          </p:cNvSpPr>
+          <p:nvPr>
+            <p:ph type="title"/>
+          </p:nvPr>
+        </p:nvSpPr>
+        <p:spPr>
+          <a:xfrm>
+            <a:off x="8141110" y="639098"/>
+            <a:ext cx="3401961" cy="3494790"/>
+          </a:xfrm>
+        </p:spPr>
+        <p:txBody>
+          <a:bodyPr vert="horz" lIns="91440" tIns="45720" rIns="91440" bIns="45720" rtlCol="0" anchor="b">
+            <a:normAutofit/>
           </a:bodyPr>
           <a:lstStyle/>
           <a:p>
-            <a:pPr>
-              <a:lnSpc>
-                <a:spcPct val="90000"/>
-              </a:lnSpc>
-              <a:buFont typeface="Calibri" panose="020F0502020204030204" pitchFamily="34" charset="0"/>
-            </a:pPr>
-            <a:r>
-              <a:rPr lang="en-US" sz="1200" b="1" dirty="0">
+            <a:r>
+              <a:rPr lang="en-US" sz="5000">
                 <a:solidFill>
-                  <a:srgbClr val="FFFFFF"/>
+                  <a:schemeClr val="tx1">
+                    <a:lumMod val="85000"/>
+                    <a:lumOff val="15000"/>
+                  </a:schemeClr>
                 </a:solidFill>
-                <a:effectLst/>
               </a:rPr>
-              <a:t>Class 0 (Non-Fraudulent Transactions)</a:t>
-            </a:r>
-            <a:endParaRPr lang="en-US" sz="1200" dirty="0">
-              <a:solidFill>
-                <a:srgbClr val="FFFFFF"/>
-              </a:solidFill>
-              <a:effectLst/>
-            </a:endParaRPr>
-          </a:p>
-          <a:p>
-            <a:pPr lvl="1">
-              <a:lnSpc>
-                <a:spcPct val="90000"/>
-              </a:lnSpc>
-              <a:spcBef>
-                <a:spcPts val="900"/>
-              </a:spcBef>
-              <a:buFont typeface="Calibri" panose="020F0502020204030204" pitchFamily="34" charset="0"/>
-            </a:pPr>
-            <a:r>
-              <a:rPr lang="en-US" sz="1200" dirty="0">
-                <a:solidFill>
-                  <a:srgbClr val="FFFFFF"/>
-                </a:solidFill>
-                <a:effectLst/>
-              </a:rPr>
-              <a:t>• </a:t>
-            </a:r>
-            <a:r>
-              <a:rPr lang="en-US" sz="1200" b="1" dirty="0">
-                <a:solidFill>
-                  <a:srgbClr val="FFFFFF"/>
-                </a:solidFill>
-                <a:effectLst/>
-              </a:rPr>
-              <a:t>Precision</a:t>
-            </a:r>
-            <a:r>
-              <a:rPr lang="en-US" sz="1200" dirty="0">
-                <a:solidFill>
-                  <a:srgbClr val="FFFFFF"/>
-                </a:solidFill>
-                <a:effectLst/>
-              </a:rPr>
-              <a:t>: </a:t>
-            </a:r>
-            <a:r>
-              <a:rPr lang="en-US" sz="1200" b="1" dirty="0">
-                <a:solidFill>
-                  <a:srgbClr val="FFFFFF"/>
-                </a:solidFill>
-                <a:effectLst/>
-              </a:rPr>
-              <a:t>1.00</a:t>
-            </a:r>
-            <a:endParaRPr lang="en-US" sz="1200" b="1" dirty="0">
-              <a:solidFill>
-                <a:srgbClr val="FFFFFF"/>
-              </a:solidFill>
-            </a:endParaRPr>
-          </a:p>
-          <a:p>
-            <a:pPr lvl="2">
-              <a:lnSpc>
-                <a:spcPct val="90000"/>
-              </a:lnSpc>
-              <a:spcBef>
-                <a:spcPts val="900"/>
-              </a:spcBef>
-              <a:buFont typeface="Calibri" panose="020F0502020204030204" pitchFamily="34" charset="0"/>
-            </a:pPr>
-            <a:r>
-              <a:rPr lang="en-US" sz="1200" dirty="0">
-                <a:solidFill>
-                  <a:srgbClr val="FFFFFF"/>
-                </a:solidFill>
-                <a:effectLst/>
-              </a:rPr>
-              <a:t>The model correctly identifies all non-fraudulent transactions with no false positives.</a:t>
-            </a:r>
-          </a:p>
-          <a:p>
-            <a:pPr lvl="1">
-              <a:lnSpc>
-                <a:spcPct val="90000"/>
-              </a:lnSpc>
-              <a:spcBef>
-                <a:spcPts val="900"/>
-              </a:spcBef>
-              <a:buFont typeface="Calibri" panose="020F0502020204030204" pitchFamily="34" charset="0"/>
-            </a:pPr>
-            <a:r>
-              <a:rPr lang="en-US" sz="1200" dirty="0">
-                <a:solidFill>
-                  <a:srgbClr val="FFFFFF"/>
-                </a:solidFill>
-                <a:effectLst/>
-              </a:rPr>
-              <a:t>• </a:t>
-            </a:r>
-            <a:r>
-              <a:rPr lang="en-US" sz="1200" b="1" dirty="0">
-                <a:solidFill>
-                  <a:srgbClr val="FFFFFF"/>
-                </a:solidFill>
-                <a:effectLst/>
-              </a:rPr>
-              <a:t>Recall</a:t>
-            </a:r>
-            <a:r>
-              <a:rPr lang="en-US" sz="1200" dirty="0">
-                <a:solidFill>
-                  <a:srgbClr val="FFFFFF"/>
-                </a:solidFill>
-                <a:effectLst/>
-              </a:rPr>
-              <a:t>: </a:t>
-            </a:r>
-            <a:r>
-              <a:rPr lang="en-US" sz="1200" b="1" dirty="0">
-                <a:solidFill>
-                  <a:srgbClr val="FFFFFF"/>
-                </a:solidFill>
-                <a:effectLst/>
-              </a:rPr>
-              <a:t>0.95</a:t>
-            </a:r>
-            <a:endParaRPr lang="en-US" sz="1200" b="1" dirty="0">
-              <a:solidFill>
-                <a:srgbClr val="FFFFFF"/>
-              </a:solidFill>
-            </a:endParaRPr>
-          </a:p>
-          <a:p>
-            <a:pPr lvl="2">
-              <a:lnSpc>
-                <a:spcPct val="90000"/>
-              </a:lnSpc>
-              <a:spcBef>
-                <a:spcPts val="900"/>
-              </a:spcBef>
-              <a:buFont typeface="Calibri" panose="020F0502020204030204" pitchFamily="34" charset="0"/>
-            </a:pPr>
-            <a:r>
-              <a:rPr lang="en-US" sz="1200" dirty="0">
-                <a:solidFill>
-                  <a:srgbClr val="FFFFFF"/>
-                </a:solidFill>
-                <a:effectLst/>
-              </a:rPr>
-              <a:t>95% of all actual non-fraudulent transactions are correctly identified.</a:t>
-            </a:r>
-          </a:p>
-          <a:p>
-            <a:pPr lvl="1">
-              <a:lnSpc>
-                <a:spcPct val="90000"/>
-              </a:lnSpc>
-              <a:spcBef>
-                <a:spcPts val="900"/>
-              </a:spcBef>
-              <a:buFont typeface="Calibri" panose="020F0502020204030204" pitchFamily="34" charset="0"/>
-            </a:pPr>
-            <a:r>
-              <a:rPr lang="en-US" sz="1200" dirty="0">
-                <a:solidFill>
-                  <a:srgbClr val="FFFFFF"/>
-                </a:solidFill>
-                <a:effectLst/>
-              </a:rPr>
-              <a:t>• </a:t>
-            </a:r>
-            <a:r>
-              <a:rPr lang="en-US" sz="1200" b="1" dirty="0">
-                <a:solidFill>
-                  <a:srgbClr val="FFFFFF"/>
-                </a:solidFill>
-                <a:effectLst/>
-              </a:rPr>
-              <a:t>F1-Score</a:t>
-            </a:r>
-            <a:r>
-              <a:rPr lang="en-US" sz="1200" dirty="0">
-                <a:solidFill>
-                  <a:srgbClr val="FFFFFF"/>
-                </a:solidFill>
-                <a:effectLst/>
-              </a:rPr>
-              <a:t>: </a:t>
-            </a:r>
-            <a:r>
-              <a:rPr lang="en-US" sz="1200" b="1" dirty="0">
-                <a:solidFill>
-                  <a:srgbClr val="FFFFFF"/>
-                </a:solidFill>
-                <a:effectLst/>
-              </a:rPr>
-              <a:t>0.98</a:t>
-            </a:r>
-            <a:endParaRPr lang="en-US" sz="1200" b="1" dirty="0">
-              <a:solidFill>
-                <a:srgbClr val="FFFFFF"/>
-              </a:solidFill>
-            </a:endParaRPr>
-          </a:p>
-          <a:p>
-            <a:pPr lvl="2">
-              <a:lnSpc>
-                <a:spcPct val="90000"/>
-              </a:lnSpc>
-              <a:spcBef>
-                <a:spcPts val="900"/>
-              </a:spcBef>
-              <a:buFont typeface="Calibri" panose="020F0502020204030204" pitchFamily="34" charset="0"/>
-            </a:pPr>
-            <a:r>
-              <a:rPr lang="en-US" sz="1200" dirty="0">
-                <a:solidFill>
-                  <a:srgbClr val="FFFFFF"/>
-                </a:solidFill>
-                <a:effectLst/>
-              </a:rPr>
-              <a:t>A balance between precision and recall, indicating exceptional performance for this class.</a:t>
+              <a:t>Precision-Recall Curve with XGBoost</a:t>
             </a:r>
           </a:p>
         </p:txBody>
       </p:sp>
       <p:pic>
         <p:nvPicPr>
-          <p:cNvPr id="5" name="Content Placeholder 4" descr="A screenshot of a computer&#10;&#10;Description automatically generated">
+          <p:cNvPr id="12" name="Content Placeholder 11" descr="A graph of a line&#10;&#10;Description automatically generated">
             <a:extLst>
               <a:ext uri="{FF2B5EF4-FFF2-40B4-BE49-F238E27FC236}">
-                <a16:creationId xmlns:a16="http://schemas.microsoft.com/office/drawing/2014/main" id="{F9106BA3-0906-B2B8-9523-290A68034693}"/>
+                <a16:creationId xmlns:a16="http://schemas.microsoft.com/office/drawing/2014/main" id="{8FB58351-5526-BF75-E67D-D4E5D714D14B}"/>
               </a:ext>
             </a:extLst>
           </p:cNvPr>
@@ -5788,25 +6549,142 @@
           </p:nvPr>
         </p:nvPicPr>
         <p:blipFill>
-          <a:blip r:embed="rId2"/>
+          <a:blip r:embed="rId3"/>
           <a:stretch>
             <a:fillRect/>
           </a:stretch>
         </p:blipFill>
         <p:spPr>
           <a:xfrm>
-            <a:off x="4742017" y="1593518"/>
-            <a:ext cx="6798082" cy="3670964"/>
+            <a:off x="881121" y="640081"/>
+            <a:ext cx="6417973" cy="5054156"/>
           </a:xfrm>
           <a:prstGeom prst="rect">
             <a:avLst/>
           </a:prstGeom>
         </p:spPr>
       </p:pic>
+      <p:cxnSp>
+        <p:nvCxnSpPr>
+          <p:cNvPr id="23" name="Straight Connector 22">
+            <a:extLst>
+              <a:ext uri="{FF2B5EF4-FFF2-40B4-BE49-F238E27FC236}">
+                <a16:creationId xmlns:a16="http://schemas.microsoft.com/office/drawing/2014/main" id="{BA22713B-ABB6-4391-97F9-0449A2B9B664}"/>
+              </a:ext>
+              <a:ext uri="{C183D7F6-B498-43B3-948B-1728B52AA6E4}">
+                <adec:decorative xmlns:adec="http://schemas.microsoft.com/office/drawing/2017/decorative" val="1"/>
+              </a:ext>
+            </a:extLst>
+          </p:cNvPr>
+          <p:cNvCxnSpPr>
+            <a:cxnSpLocks noGrp="1" noRot="1" noChangeAspect="1" noMove="1" noResize="1" noEditPoints="1" noAdjustHandles="1" noChangeArrowheads="1" noChangeShapeType="1"/>
+          </p:cNvCxnSpPr>
+          <p:nvPr>
+            <p:extLst>
+              <p:ext uri="{386F3935-93C4-4BCD-93E2-E3B085C9AB24}">
+                <p16:designElem xmlns:p16="http://schemas.microsoft.com/office/powerpoint/2015/main" val="1"/>
+              </p:ext>
+            </p:extLst>
+          </p:nvPr>
+        </p:nvCxnSpPr>
+        <p:spPr>
+          <a:xfrm>
+            <a:off x="8209305" y="4294754"/>
+            <a:ext cx="3200400" cy="0"/>
+          </a:xfrm>
+          <a:prstGeom prst="line">
+            <a:avLst/>
+          </a:prstGeom>
+          <a:ln w="12700">
+            <a:solidFill>
+              <a:schemeClr val="tx1">
+                <a:lumMod val="75000"/>
+                <a:lumOff val="25000"/>
+              </a:schemeClr>
+            </a:solidFill>
+          </a:ln>
+        </p:spPr>
+        <p:style>
+          <a:lnRef idx="1">
+            <a:schemeClr val="accent1"/>
+          </a:lnRef>
+          <a:fillRef idx="0">
+            <a:schemeClr val="accent1"/>
+          </a:fillRef>
+          <a:effectRef idx="0">
+            <a:schemeClr val="accent1"/>
+          </a:effectRef>
+          <a:fontRef idx="minor">
+            <a:schemeClr val="tx1"/>
+          </a:fontRef>
+        </p:style>
+      </p:cxnSp>
+      <p:sp>
+        <p:nvSpPr>
+          <p:cNvPr id="25" name="Rectangle 24">
+            <a:extLst>
+              <a:ext uri="{FF2B5EF4-FFF2-40B4-BE49-F238E27FC236}">
+                <a16:creationId xmlns:a16="http://schemas.microsoft.com/office/drawing/2014/main" id="{8D4480B4-953D-41FA-9052-09AB3A026947}"/>
+              </a:ext>
+              <a:ext uri="{C183D7F6-B498-43B3-948B-1728B52AA6E4}">
+                <adec:decorative xmlns:adec="http://schemas.microsoft.com/office/drawing/2017/decorative" val="1"/>
+              </a:ext>
+            </a:extLst>
+          </p:cNvPr>
+          <p:cNvSpPr>
+            <a:spLocks noGrp="1" noRot="1" noChangeAspect="1" noMove="1" noResize="1" noEditPoints="1" noAdjustHandles="1" noChangeArrowheads="1" noChangeShapeType="1" noTextEdit="1"/>
+          </p:cNvSpPr>
+          <p:nvPr>
+            <p:extLst>
+              <p:ext uri="{386F3935-93C4-4BCD-93E2-E3B085C9AB24}">
+                <p16:designElem xmlns:p16="http://schemas.microsoft.com/office/powerpoint/2015/main" val="1"/>
+              </p:ext>
+            </p:extLst>
+          </p:nvPr>
+        </p:nvSpPr>
+        <p:spPr>
+          <a:xfrm>
+            <a:off x="0" y="6400800"/>
+            <a:ext cx="12192000" cy="457200"/>
+          </a:xfrm>
+          <a:prstGeom prst="rect">
+            <a:avLst/>
+          </a:prstGeom>
+          <a:solidFill>
+            <a:srgbClr val="262626"/>
+          </a:solidFill>
+          <a:ln>
+            <a:noFill/>
+          </a:ln>
+        </p:spPr>
+        <p:style>
+          <a:lnRef idx="2">
+            <a:schemeClr val="accent1">
+              <a:shade val="50000"/>
+            </a:schemeClr>
+          </a:lnRef>
+          <a:fillRef idx="1">
+            <a:schemeClr val="accent1"/>
+          </a:fillRef>
+          <a:effectRef idx="0">
+            <a:schemeClr val="accent1"/>
+          </a:effectRef>
+          <a:fontRef idx="minor">
+            <a:schemeClr val="lt1"/>
+          </a:fontRef>
+        </p:style>
+        <p:txBody>
+          <a:bodyPr/>
+          <a:lstStyle/>
+          <a:p>
+            <a:endParaRPr lang="en-US"/>
+          </a:p>
+        </p:txBody>
+      </p:sp>
     </p:spTree>
     <p:extLst>
       <p:ext uri="{BB962C8B-B14F-4D97-AF65-F5344CB8AC3E}">
-        <p14:creationId xmlns:p14="http://schemas.microsoft.com/office/powerpoint/2010/main" val="1225487577"/>
+        <p14:creationId xmlns:p14="http://schemas.microsoft.com/office/powerpoint/2010/main" val="2343250941"/>
       </p:ext>
     </p:extLst>
   </p:cSld>
@@ -5846,7 +6724,7 @@
           <p:cNvPr id="15" name="Rectangle 14">
             <a:extLst>
               <a:ext uri="{FF2B5EF4-FFF2-40B4-BE49-F238E27FC236}">
-                <a16:creationId xmlns:a16="http://schemas.microsoft.com/office/drawing/2014/main" id="{0AB6E427-3F73-4C06-A5D5-AE52C3883B50}"/>
+                <a16:creationId xmlns:a16="http://schemas.microsoft.com/office/drawing/2014/main" id="{C8DD82D3-D002-45B0-B16A-82B3DA4EFDDB}"/>
               </a:ext>
               <a:ext uri="{C183D7F6-B498-43B3-948B-1728B52AA6E4}">
                 <adec:decorative xmlns:adec="http://schemas.microsoft.com/office/drawing/2017/decorative" val="1"/>
@@ -5866,75 +6744,12 @@
         </p:nvSpPr>
         <p:spPr>
           <a:xfrm>
-            <a:off x="5685" y="0"/>
-            <a:ext cx="12186315" cy="6858000"/>
+            <a:off x="3048" y="0"/>
+            <a:ext cx="12188952" cy="6858000"/>
           </a:xfrm>
           <a:prstGeom prst="rect">
             <a:avLst/>
           </a:prstGeom>
-          <a:ln>
-            <a:noFill/>
-          </a:ln>
-        </p:spPr>
-        <p:style>
-          <a:lnRef idx="2">
-            <a:schemeClr val="accent6">
-              <a:shade val="50000"/>
-            </a:schemeClr>
-          </a:lnRef>
-          <a:fillRef idx="1001">
-            <a:schemeClr val="lt1"/>
-          </a:fillRef>
-          <a:effectRef idx="0">
-            <a:schemeClr val="accent6"/>
-          </a:effectRef>
-          <a:fontRef idx="minor">
-            <a:schemeClr val="lt1"/>
-          </a:fontRef>
-        </p:style>
-        <p:txBody>
-          <a:bodyPr rtlCol="0" anchor="ctr"/>
-          <a:lstStyle/>
-          <a:p>
-            <a:pPr algn="ctr"/>
-            <a:endParaRPr lang="en-US"/>
-          </a:p>
-        </p:txBody>
-      </p:sp>
-      <p:sp>
-        <p:nvSpPr>
-          <p:cNvPr id="16" name="Rectangle 15">
-            <a:extLst>
-              <a:ext uri="{FF2B5EF4-FFF2-40B4-BE49-F238E27FC236}">
-                <a16:creationId xmlns:a16="http://schemas.microsoft.com/office/drawing/2014/main" id="{D8C9BDAA-0390-4B39-9B5C-BC95E5120DA4}"/>
-              </a:ext>
-              <a:ext uri="{C183D7F6-B498-43B3-948B-1728B52AA6E4}">
-                <adec:decorative xmlns:adec="http://schemas.microsoft.com/office/drawing/2017/decorative" val="1"/>
-              </a:ext>
-            </a:extLst>
-          </p:cNvPr>
-          <p:cNvSpPr>
-            <a:spLocks noGrp="1" noRot="1" noChangeAspect="1" noMove="1" noResize="1" noEditPoints="1" noAdjustHandles="1" noChangeArrowheads="1" noChangeShapeType="1" noTextEdit="1"/>
-          </p:cNvSpPr>
-          <p:nvPr>
-            <p:extLst>
-              <p:ext uri="{386F3935-93C4-4BCD-93E2-E3B085C9AB24}">
-                <p16:designElem xmlns:p16="http://schemas.microsoft.com/office/powerpoint/2015/main" val="1"/>
-              </p:ext>
-            </p:extLst>
-          </p:nvPr>
-        </p:nvSpPr>
-        <p:spPr>
-          <a:xfrm>
-            <a:off x="16" y="0"/>
-            <a:ext cx="4059919" cy="6858000"/>
-          </a:xfrm>
-          <a:prstGeom prst="rect">
-            <a:avLst/>
-          </a:prstGeom>
-          <a:solidFill>
-            <a:srgbClr val="32B67D"/>
-          </a:solidFill>
           <a:ln>
             <a:noFill/>
           </a:ln>
@@ -5956,9 +6771,10 @@
           </a:fontRef>
         </p:style>
         <p:txBody>
-          <a:bodyPr/>
-          <a:lstStyle/>
-          <a:p>
+          <a:bodyPr rtlCol="0" anchor="ctr"/>
+          <a:lstStyle/>
+          <a:p>
+            <a:pPr algn="ctr"/>
             <a:endParaRPr lang="en-US"/>
           </a:p>
         </p:txBody>
@@ -5968,7 +6784,7 @@
           <p:cNvPr id="2" name="Title 1">
             <a:extLst>
               <a:ext uri="{FF2B5EF4-FFF2-40B4-BE49-F238E27FC236}">
-                <a16:creationId xmlns:a16="http://schemas.microsoft.com/office/drawing/2014/main" id="{FBB07C2B-2A7B-078C-ED04-00CAC7CD1AB7}"/>
+                <a16:creationId xmlns:a16="http://schemas.microsoft.com/office/drawing/2014/main" id="{AFC15495-DD17-3D20-3FBC-515085231E12}"/>
               </a:ext>
             </a:extLst>
           </p:cNvPr>
@@ -5981,33 +6797,30 @@
         </p:nvSpPr>
         <p:spPr>
           <a:xfrm>
-            <a:off x="487553" y="338851"/>
-            <a:ext cx="3084844" cy="1961086"/>
-          </a:xfrm>
-        </p:spPr>
-        <p:txBody>
-          <a:bodyPr>
+            <a:off x="473533" y="643467"/>
+            <a:ext cx="3243485" cy="5126203"/>
+          </a:xfrm>
+        </p:spPr>
+        <p:txBody>
+          <a:bodyPr anchor="ctr">
             <a:normAutofit/>
           </a:bodyPr>
           <a:lstStyle/>
           <a:p>
-            <a:r>
-              <a:rPr lang="en-US" sz="2500" dirty="0">
-                <a:solidFill>
-                  <a:srgbClr val="FFFFFF"/>
-                </a:solidFill>
-              </a:rPr>
-              <a:t>Precision, Recall, and F1-Score Analysis for Class 1 (Fraudulent Transactions)</a:t>
+            <a:pPr algn="r"/>
+            <a:r>
+              <a:rPr lang="en-US" dirty="0"/>
+              <a:t>Analysis &amp; Conclusion</a:t>
             </a:r>
           </a:p>
         </p:txBody>
       </p:sp>
       <p:cxnSp>
         <p:nvCxnSpPr>
-          <p:cNvPr id="14" name="Straight Connector 13">
+          <p:cNvPr id="17" name="Straight Connector 16">
             <a:extLst>
               <a:ext uri="{FF2B5EF4-FFF2-40B4-BE49-F238E27FC236}">
-                <a16:creationId xmlns:a16="http://schemas.microsoft.com/office/drawing/2014/main" id="{E04A321A-A039-4720-87B4-66A4210E0D57}"/>
+                <a16:creationId xmlns:a16="http://schemas.microsoft.com/office/drawing/2014/main" id="{9F09C252-16FE-4557-AD6D-BB5CA773496C}"/>
               </a:ext>
               <a:ext uri="{C183D7F6-B498-43B3-948B-1728B52AA6E4}">
                 <adec:decorative xmlns:adec="http://schemas.microsoft.com/office/drawing/2017/decorative" val="1"/>
@@ -6027,16 +6840,17 @@
         </p:nvCxnSpPr>
         <p:spPr>
           <a:xfrm>
-            <a:off x="571752" y="2638787"/>
-            <a:ext cx="2743200" cy="0"/>
+            <a:off x="4042052" y="1778497"/>
+            <a:ext cx="0" cy="3200400"/>
           </a:xfrm>
           <a:prstGeom prst="line">
             <a:avLst/>
           </a:prstGeom>
           <a:ln w="19050">
             <a:solidFill>
-              <a:schemeClr val="accent1"/>
+              <a:schemeClr val="tx1"/>
             </a:solidFill>
+            <a:miter lim="800000"/>
           </a:ln>
         </p:spPr>
         <p:style>
@@ -6059,7 +6873,7 @@
           <p:cNvPr id="3" name="Content Placeholder 2">
             <a:extLst>
               <a:ext uri="{FF2B5EF4-FFF2-40B4-BE49-F238E27FC236}">
-                <a16:creationId xmlns:a16="http://schemas.microsoft.com/office/drawing/2014/main" id="{C894F89D-9FB8-9497-467C-030AC7464CC2}"/>
+                <a16:creationId xmlns:a16="http://schemas.microsoft.com/office/drawing/2014/main" id="{FE16B9C9-A7BF-BFA1-DCDC-E0883B18E20C}"/>
               </a:ext>
             </a:extLst>
           </p:cNvPr>
@@ -6072,330 +6886,58 @@
         </p:nvSpPr>
         <p:spPr>
           <a:xfrm>
-            <a:off x="522427" y="2456512"/>
-            <a:ext cx="3049970" cy="4062637"/>
-          </a:xfrm>
-        </p:spPr>
-        <p:txBody>
-          <a:bodyPr>
-            <a:noAutofit/>
+            <a:off x="4187503" y="135467"/>
+            <a:ext cx="7351376" cy="6129866"/>
+          </a:xfrm>
+        </p:spPr>
+        <p:txBody>
+          <a:bodyPr anchor="ctr">
+            <a:normAutofit/>
           </a:bodyPr>
           <a:lstStyle/>
           <a:p>
-            <a:pPr>
-              <a:lnSpc>
-                <a:spcPct val="100000"/>
-              </a:lnSpc>
-            </a:pPr>
-            <a:r>
-              <a:rPr lang="en-US" sz="1200" b="1" dirty="0">
+            <a:r>
+              <a:rPr lang="en-US" dirty="0">
                 <a:solidFill>
-                  <a:srgbClr val="FFFFFF"/>
+                  <a:srgbClr val="0E0E0E"/>
                 </a:solidFill>
                 <a:effectLst/>
+                <a:latin typeface=".AppleSystemUIFont"/>
               </a:rPr>
-              <a:t>Class 1 (Fraudulent Transactions)</a:t>
-            </a:r>
-            <a:endParaRPr lang="en-US" sz="1200" dirty="0">
-              <a:solidFill>
-                <a:srgbClr val="FFFFFF"/>
-              </a:solidFill>
-              <a:effectLst/>
-            </a:endParaRPr>
-          </a:p>
-          <a:p>
-            <a:pPr marL="201168" lvl="1" indent="0">
-              <a:lnSpc>
-                <a:spcPct val="100000"/>
-              </a:lnSpc>
-              <a:spcBef>
-                <a:spcPts val="900"/>
-              </a:spcBef>
-              <a:buNone/>
-            </a:pPr>
-            <a:r>
-              <a:rPr lang="en-US" sz="1200" dirty="0">
+              <a:t>While the model performs well overall (95% accuracy), its ability to detect fraudulent transactions specifically (Class 1 metrics) falls short of the target. The highest F1-Score we were able to achieve for Class 1 using our </a:t>
+            </a:r>
+            <a:r>
+              <a:rPr lang="en-US" dirty="0" err="1">
                 <a:solidFill>
-                  <a:srgbClr val="FFFFFF"/>
+                  <a:srgbClr val="0E0E0E"/>
                 </a:solidFill>
                 <a:effectLst/>
+                <a:latin typeface=".AppleSystemUIFont"/>
               </a:rPr>
-              <a:t>• </a:t>
-            </a:r>
-            <a:r>
-              <a:rPr lang="en-US" sz="1200" b="1" dirty="0">
+              <a:t>XGBoost</a:t>
+            </a:r>
+            <a:r>
+              <a:rPr lang="en-US" dirty="0">
                 <a:solidFill>
-                  <a:srgbClr val="FFFFFF"/>
+                  <a:srgbClr val="0E0E0E"/>
                 </a:solidFill>
                 <a:effectLst/>
+                <a:latin typeface=".AppleSystemUIFont"/>
               </a:rPr>
-              <a:t>Precision</a:t>
-            </a:r>
-            <a:r>
-              <a:rPr lang="en-US" sz="1200" dirty="0">
-                <a:solidFill>
-                  <a:srgbClr val="FFFFFF"/>
-                </a:solidFill>
-                <a:effectLst/>
-              </a:rPr>
-              <a:t>: </a:t>
-            </a:r>
-            <a:r>
-              <a:rPr lang="en-US" sz="1200" b="1" dirty="0">
-                <a:solidFill>
-                  <a:srgbClr val="FFFFFF"/>
-                </a:solidFill>
-                <a:effectLst/>
-              </a:rPr>
-              <a:t>0.11</a:t>
-            </a:r>
-            <a:endParaRPr lang="en-US" sz="1200" dirty="0">
-              <a:solidFill>
-                <a:srgbClr val="FFFFFF"/>
-              </a:solidFill>
-              <a:effectLst/>
-            </a:endParaRPr>
-          </a:p>
-          <a:p>
-            <a:pPr marL="384048" lvl="2" indent="0">
-              <a:lnSpc>
-                <a:spcPct val="100000"/>
-              </a:lnSpc>
-              <a:spcBef>
-                <a:spcPts val="900"/>
-              </a:spcBef>
-              <a:buNone/>
-            </a:pPr>
-            <a:r>
-              <a:rPr lang="en-US" sz="1200" dirty="0">
-                <a:solidFill>
-                  <a:srgbClr val="FFFFFF"/>
-                </a:solidFill>
-                <a:effectLst/>
-              </a:rPr>
-              <a:t>Only 11% of flagged fraudulent transactions are actual frauds. This low precision indicates a high number of false positives, leading to inefficiency in real-world use.</a:t>
-            </a:r>
-          </a:p>
-          <a:p>
-            <a:pPr marL="201168" lvl="1" indent="0">
-              <a:lnSpc>
-                <a:spcPct val="100000"/>
-              </a:lnSpc>
-              <a:spcBef>
-                <a:spcPts val="900"/>
-              </a:spcBef>
-              <a:buNone/>
-            </a:pPr>
-            <a:r>
-              <a:rPr lang="en-US" sz="1200" dirty="0">
-                <a:solidFill>
-                  <a:srgbClr val="FFFFFF"/>
-                </a:solidFill>
-                <a:effectLst/>
-              </a:rPr>
-              <a:t>• </a:t>
-            </a:r>
-            <a:r>
-              <a:rPr lang="en-US" sz="1200" b="1" dirty="0">
-                <a:solidFill>
-                  <a:srgbClr val="FFFFFF"/>
-                </a:solidFill>
-                <a:effectLst/>
-              </a:rPr>
-              <a:t>Recall</a:t>
-            </a:r>
-            <a:r>
-              <a:rPr lang="en-US" sz="1200" dirty="0">
-                <a:solidFill>
-                  <a:srgbClr val="FFFFFF"/>
-                </a:solidFill>
-                <a:effectLst/>
-              </a:rPr>
-              <a:t>: </a:t>
-            </a:r>
-            <a:r>
-              <a:rPr lang="en-US" sz="1200" b="1" dirty="0">
-                <a:solidFill>
-                  <a:srgbClr val="FFFFFF"/>
-                </a:solidFill>
-                <a:effectLst/>
-              </a:rPr>
-              <a:t>0.88</a:t>
-            </a:r>
-            <a:endParaRPr lang="en-US" sz="1200" b="1" dirty="0">
-              <a:solidFill>
-                <a:srgbClr val="FFFFFF"/>
-              </a:solidFill>
-            </a:endParaRPr>
-          </a:p>
-          <a:p>
-            <a:pPr marL="384048" lvl="2" indent="0">
-              <a:lnSpc>
-                <a:spcPct val="100000"/>
-              </a:lnSpc>
-              <a:spcBef>
-                <a:spcPts val="900"/>
-              </a:spcBef>
-              <a:buNone/>
-            </a:pPr>
-            <a:r>
-              <a:rPr lang="en-US" sz="1200" dirty="0">
-                <a:solidFill>
-                  <a:srgbClr val="FFFFFF"/>
-                </a:solidFill>
-                <a:effectLst/>
-              </a:rPr>
-              <a:t>The model detects 88% of actual fraudulent transactions, which is a strong point.</a:t>
-            </a:r>
-          </a:p>
-          <a:p>
-            <a:pPr marL="201168" lvl="1" indent="0">
-              <a:lnSpc>
-                <a:spcPct val="100000"/>
-              </a:lnSpc>
-              <a:spcBef>
-                <a:spcPts val="900"/>
-              </a:spcBef>
-              <a:buNone/>
-            </a:pPr>
-            <a:r>
-              <a:rPr lang="en-US" sz="1200" dirty="0">
-                <a:solidFill>
-                  <a:srgbClr val="FFFFFF"/>
-                </a:solidFill>
-                <a:effectLst/>
-              </a:rPr>
-              <a:t>• </a:t>
-            </a:r>
-            <a:r>
-              <a:rPr lang="en-US" sz="1200" b="1" dirty="0">
-                <a:solidFill>
-                  <a:srgbClr val="FFFFFF"/>
-                </a:solidFill>
-                <a:effectLst/>
-              </a:rPr>
-              <a:t>F1-Score</a:t>
-            </a:r>
-            <a:r>
-              <a:rPr lang="en-US" sz="1200" dirty="0">
-                <a:solidFill>
-                  <a:srgbClr val="FFFFFF"/>
-                </a:solidFill>
-                <a:effectLst/>
-              </a:rPr>
-              <a:t>: </a:t>
-            </a:r>
-            <a:r>
-              <a:rPr lang="en-US" sz="1200" b="1" dirty="0">
-                <a:solidFill>
-                  <a:srgbClr val="FFFFFF"/>
-                </a:solidFill>
-                <a:effectLst/>
-              </a:rPr>
-              <a:t>0.20</a:t>
-            </a:r>
-            <a:endParaRPr lang="en-US" sz="1200" b="1" dirty="0">
-              <a:solidFill>
-                <a:srgbClr val="FFFFFF"/>
-              </a:solidFill>
-            </a:endParaRPr>
-          </a:p>
-          <a:p>
-            <a:pPr marL="384048" lvl="2" indent="0">
-              <a:lnSpc>
-                <a:spcPct val="100000"/>
-              </a:lnSpc>
-              <a:spcBef>
-                <a:spcPts val="900"/>
-              </a:spcBef>
-              <a:buNone/>
-            </a:pPr>
-            <a:r>
-              <a:rPr lang="en-US" sz="1200" dirty="0">
-                <a:solidFill>
-                  <a:srgbClr val="FFFFFF"/>
-                </a:solidFill>
-                <a:effectLst/>
-              </a:rPr>
-              <a:t>The balance between precision and recall is poor, reflecting the low effectiveness of the model in identifying fraudulent transactions.</a:t>
-            </a:r>
-          </a:p>
-        </p:txBody>
-      </p:sp>
-      <p:pic>
-        <p:nvPicPr>
-          <p:cNvPr id="5" name="Content Placeholder 4" descr="A screenshot of a computer&#10;&#10;Description automatically generated">
+              <a:t> model was 52% of the 75% or more goal.</a:t>
+            </a:r>
+          </a:p>
+          <a:p>
+            <a:endParaRPr lang="en-US" dirty="0"/>
+          </a:p>
+        </p:txBody>
+      </p:sp>
+      <p:sp>
+        <p:nvSpPr>
+          <p:cNvPr id="19" name="Rectangle 18">
             <a:extLst>
               <a:ext uri="{FF2B5EF4-FFF2-40B4-BE49-F238E27FC236}">
-                <a16:creationId xmlns:a16="http://schemas.microsoft.com/office/drawing/2014/main" id="{1AE41593-66CC-F8BE-0225-446431FE4AB3}"/>
-              </a:ext>
-            </a:extLst>
-          </p:cNvPr>
-          <p:cNvPicPr>
-            <a:picLocks noChangeAspect="1"/>
-          </p:cNvPicPr>
-          <p:nvPr/>
-        </p:nvPicPr>
-        <p:blipFill>
-          <a:blip r:embed="rId2"/>
-          <a:stretch>
-            <a:fillRect/>
-          </a:stretch>
-        </p:blipFill>
-        <p:spPr>
-          <a:xfrm>
-            <a:off x="4742017" y="1593518"/>
-            <a:ext cx="6798082" cy="3670964"/>
-          </a:xfrm>
-          <a:prstGeom prst="rect">
-            <a:avLst/>
-          </a:prstGeom>
-        </p:spPr>
-      </p:pic>
-    </p:spTree>
-    <p:extLst>
-      <p:ext uri="{BB962C8B-B14F-4D97-AF65-F5344CB8AC3E}">
-        <p14:creationId xmlns:p14="http://schemas.microsoft.com/office/powerpoint/2010/main" val="302357261"/>
-      </p:ext>
-    </p:extLst>
-  </p:cSld>
-  <p:clrMapOvr>
-    <a:masterClrMapping/>
-  </p:clrMapOvr>
-</p:sld>
-</file>
-
-<file path=ppt/slides/slide7.xml><?xml version="1.0" encoding="utf-8"?>
-<p:sld xmlns:a="http://schemas.openxmlformats.org/drawingml/2006/main" xmlns:r="http://schemas.openxmlformats.org/officeDocument/2006/relationships" xmlns:p="http://schemas.openxmlformats.org/presentationml/2006/main">
-  <p:cSld>
-    <p:bg>
-      <p:bgPr>
-        <a:solidFill>
-          <a:schemeClr val="bg1"/>
-        </a:solidFill>
-        <a:effectLst/>
-      </p:bgPr>
-    </p:bg>
-    <p:spTree>
-      <p:nvGrpSpPr>
-        <p:cNvPr id="1" name=""/>
-        <p:cNvGrpSpPr/>
-        <p:nvPr/>
-      </p:nvGrpSpPr>
-      <p:grpSpPr>
-        <a:xfrm>
-          <a:off x="0" y="0"/>
-          <a:ext cx="0" cy="0"/>
-          <a:chOff x="0" y="0"/>
-          <a:chExt cx="0" cy="0"/>
-        </a:xfrm>
-      </p:grpSpPr>
-      <p:sp useBgFill="1">
-        <p:nvSpPr>
-          <p:cNvPr id="15" name="Rectangle 14">
-            <a:extLst>
-              <a:ext uri="{FF2B5EF4-FFF2-40B4-BE49-F238E27FC236}">
-                <a16:creationId xmlns:a16="http://schemas.microsoft.com/office/drawing/2014/main" id="{C8DD82D3-D002-45B0-B16A-82B3DA4EFDDB}"/>
+                <a16:creationId xmlns:a16="http://schemas.microsoft.com/office/drawing/2014/main" id="{14552793-7DFF-4EC7-AC69-D34A75D01880}"/>
               </a:ext>
               <a:ext uri="{C183D7F6-B498-43B3-948B-1728B52AA6E4}">
                 <adec:decorative xmlns:adec="http://schemas.microsoft.com/office/drawing/2017/decorative" val="1"/>
@@ -6415,12 +6957,15 @@
         </p:nvSpPr>
         <p:spPr>
           <a:xfrm>
-            <a:off x="3048" y="0"/>
-            <a:ext cx="12188952" cy="6858000"/>
+            <a:off x="0" y="6400800"/>
+            <a:ext cx="12192000" cy="457200"/>
           </a:xfrm>
           <a:prstGeom prst="rect">
             <a:avLst/>
           </a:prstGeom>
+          <a:solidFill>
+            <a:srgbClr val="262626"/>
+          </a:solidFill>
           <a:ln>
             <a:noFill/>
           </a:ln>
@@ -6442,190 +6987,6 @@
           </a:fontRef>
         </p:style>
         <p:txBody>
-          <a:bodyPr rtlCol="0" anchor="ctr"/>
-          <a:lstStyle/>
-          <a:p>
-            <a:pPr algn="ctr"/>
-            <a:endParaRPr lang="en-US"/>
-          </a:p>
-        </p:txBody>
-      </p:sp>
-      <p:sp>
-        <p:nvSpPr>
-          <p:cNvPr id="2" name="Title 1">
-            <a:extLst>
-              <a:ext uri="{FF2B5EF4-FFF2-40B4-BE49-F238E27FC236}">
-                <a16:creationId xmlns:a16="http://schemas.microsoft.com/office/drawing/2014/main" id="{AFC15495-DD17-3D20-3FBC-515085231E12}"/>
-              </a:ext>
-            </a:extLst>
-          </p:cNvPr>
-          <p:cNvSpPr>
-            <a:spLocks noGrp="1"/>
-          </p:cNvSpPr>
-          <p:nvPr>
-            <p:ph type="title"/>
-          </p:nvPr>
-        </p:nvSpPr>
-        <p:spPr>
-          <a:xfrm>
-            <a:off x="473533" y="643467"/>
-            <a:ext cx="3243485" cy="5126203"/>
-          </a:xfrm>
-        </p:spPr>
-        <p:txBody>
-          <a:bodyPr anchor="ctr">
-            <a:normAutofit/>
-          </a:bodyPr>
-          <a:lstStyle/>
-          <a:p>
-            <a:pPr algn="r"/>
-            <a:r>
-              <a:rPr lang="en-US" dirty="0"/>
-              <a:t>Analysis &amp; Conclusion</a:t>
-            </a:r>
-          </a:p>
-        </p:txBody>
-      </p:sp>
-      <p:cxnSp>
-        <p:nvCxnSpPr>
-          <p:cNvPr id="17" name="Straight Connector 16">
-            <a:extLst>
-              <a:ext uri="{FF2B5EF4-FFF2-40B4-BE49-F238E27FC236}">
-                <a16:creationId xmlns:a16="http://schemas.microsoft.com/office/drawing/2014/main" id="{9F09C252-16FE-4557-AD6D-BB5CA773496C}"/>
-              </a:ext>
-              <a:ext uri="{C183D7F6-B498-43B3-948B-1728B52AA6E4}">
-                <adec:decorative xmlns:adec="http://schemas.microsoft.com/office/drawing/2017/decorative" val="1"/>
-              </a:ext>
-            </a:extLst>
-          </p:cNvPr>
-          <p:cNvCxnSpPr>
-            <a:cxnSpLocks noGrp="1" noRot="1" noChangeAspect="1" noMove="1" noResize="1" noEditPoints="1" noAdjustHandles="1" noChangeArrowheads="1" noChangeShapeType="1"/>
-          </p:cNvCxnSpPr>
-          <p:nvPr>
-            <p:extLst>
-              <p:ext uri="{386F3935-93C4-4BCD-93E2-E3B085C9AB24}">
-                <p16:designElem xmlns:p16="http://schemas.microsoft.com/office/powerpoint/2015/main" val="1"/>
-              </p:ext>
-            </p:extLst>
-          </p:nvPr>
-        </p:nvCxnSpPr>
-        <p:spPr>
-          <a:xfrm>
-            <a:off x="4042052" y="1778497"/>
-            <a:ext cx="0" cy="3200400"/>
-          </a:xfrm>
-          <a:prstGeom prst="line">
-            <a:avLst/>
-          </a:prstGeom>
-          <a:ln w="19050">
-            <a:solidFill>
-              <a:schemeClr val="tx1"/>
-            </a:solidFill>
-            <a:miter lim="800000"/>
-          </a:ln>
-        </p:spPr>
-        <p:style>
-          <a:lnRef idx="1">
-            <a:schemeClr val="accent1"/>
-          </a:lnRef>
-          <a:fillRef idx="0">
-            <a:schemeClr val="accent1"/>
-          </a:fillRef>
-          <a:effectRef idx="0">
-            <a:schemeClr val="accent1"/>
-          </a:effectRef>
-          <a:fontRef idx="minor">
-            <a:schemeClr val="tx1"/>
-          </a:fontRef>
-        </p:style>
-      </p:cxnSp>
-      <p:sp>
-        <p:nvSpPr>
-          <p:cNvPr id="3" name="Content Placeholder 2">
-            <a:extLst>
-              <a:ext uri="{FF2B5EF4-FFF2-40B4-BE49-F238E27FC236}">
-                <a16:creationId xmlns:a16="http://schemas.microsoft.com/office/drawing/2014/main" id="{FE16B9C9-A7BF-BFA1-DCDC-E0883B18E20C}"/>
-              </a:ext>
-            </a:extLst>
-          </p:cNvPr>
-          <p:cNvSpPr>
-            <a:spLocks noGrp="1"/>
-          </p:cNvSpPr>
-          <p:nvPr>
-            <p:ph idx="1"/>
-          </p:nvPr>
-        </p:nvSpPr>
-        <p:spPr>
-          <a:xfrm>
-            <a:off x="4187503" y="135467"/>
-            <a:ext cx="7351376" cy="6129866"/>
-          </a:xfrm>
-        </p:spPr>
-        <p:txBody>
-          <a:bodyPr anchor="ctr">
-            <a:normAutofit/>
-          </a:bodyPr>
-          <a:lstStyle/>
-          <a:p>
-            <a:endParaRPr lang="en-US" dirty="0"/>
-          </a:p>
-        </p:txBody>
-      </p:sp>
-      <p:sp>
-        <p:nvSpPr>
-          <p:cNvPr id="19" name="Rectangle 18">
-            <a:extLst>
-              <a:ext uri="{FF2B5EF4-FFF2-40B4-BE49-F238E27FC236}">
-                <a16:creationId xmlns:a16="http://schemas.microsoft.com/office/drawing/2014/main" id="{14552793-7DFF-4EC7-AC69-D34A75D01880}"/>
-              </a:ext>
-              <a:ext uri="{C183D7F6-B498-43B3-948B-1728B52AA6E4}">
-                <adec:decorative xmlns:adec="http://schemas.microsoft.com/office/drawing/2017/decorative" val="1"/>
-              </a:ext>
-            </a:extLst>
-          </p:cNvPr>
-          <p:cNvSpPr>
-            <a:spLocks noGrp="1" noRot="1" noChangeAspect="1" noMove="1" noResize="1" noEditPoints="1" noAdjustHandles="1" noChangeArrowheads="1" noChangeShapeType="1" noTextEdit="1"/>
-          </p:cNvSpPr>
-          <p:nvPr>
-            <p:extLst>
-              <p:ext uri="{386F3935-93C4-4BCD-93E2-E3B085C9AB24}">
-                <p16:designElem xmlns:p16="http://schemas.microsoft.com/office/powerpoint/2015/main" val="1"/>
-              </p:ext>
-            </p:extLst>
-          </p:nvPr>
-        </p:nvSpPr>
-        <p:spPr>
-          <a:xfrm>
-            <a:off x="0" y="6400800"/>
-            <a:ext cx="12192000" cy="457200"/>
-          </a:xfrm>
-          <a:prstGeom prst="rect">
-            <a:avLst/>
-          </a:prstGeom>
-          <a:solidFill>
-            <a:srgbClr val="262626"/>
-          </a:solidFill>
-          <a:ln>
-            <a:noFill/>
-          </a:ln>
-        </p:spPr>
-        <p:style>
-          <a:lnRef idx="2">
-            <a:schemeClr val="accent1">
-              <a:shade val="50000"/>
-            </a:schemeClr>
-          </a:lnRef>
-          <a:fillRef idx="1">
-            <a:schemeClr val="accent1"/>
-          </a:fillRef>
-          <a:effectRef idx="0">
-            <a:schemeClr val="accent1"/>
-          </a:effectRef>
-          <a:fontRef idx="minor">
-            <a:schemeClr val="lt1"/>
-          </a:fontRef>
-        </p:style>
-        <p:txBody>
           <a:bodyPr/>
           <a:lstStyle/>
           <a:p>
@@ -6646,7 +7007,7 @@
 </p:sld>
 </file>
 
-<file path=ppt/slides/slide8.xml><?xml version="1.0" encoding="utf-8"?>
+<file path=ppt/slides/slide7.xml><?xml version="1.0" encoding="utf-8"?>
 <p:sld xmlns:a="http://schemas.openxmlformats.org/drawingml/2006/main" xmlns:r="http://schemas.openxmlformats.org/officeDocument/2006/relationships" xmlns:p="http://schemas.openxmlformats.org/presentationml/2006/main">
   <p:cSld>
     <p:bg>

</xml_diff>

<commit_message>
updated .pptx and accuracy model xgboost_1.4mil.ipynb
</commit_message>
<xml_diff>
--- a/Project 4 Presentation.pptx
+++ b/Project 4 Presentation.pptx
@@ -691,7 +691,16 @@
             </a:r>
             <a:r>
               <a:rPr lang="en-US" dirty="0"/>
-              <a:t>While we were able to achieve higher recall values for Class 1 (fraudulent transactions), there was extremely low precision, meaning it often predicts more false positives, flagging legitimate transactions as fraudulent. This model did not perform well due to the imbalanced dataset.</a:t>
+              <a:t>While we were able to achieve higher recall values for Class 1 (fraudulent transactions), there was extremely low precision, meaning it predicts more false positives, flagging legitimate transactions as fraudulent. We decided to experiment with other models to see if we could get higher precision, while maintaining a 75% or higher on the recall values. </a:t>
+            </a:r>
+          </a:p>
+          <a:p>
+            <a:endParaRPr lang="en-US" dirty="0"/>
+          </a:p>
+          <a:p>
+            <a:r>
+              <a:rPr lang="en-US" dirty="0"/>
+              <a:t>In addition, it took about 30 minutes to run the smaller dataset of 23k records and over 2 hours to run the larger dataset of 1.4mil records. We also wanted to find a model that potentially performed better in processing time.</a:t>
             </a:r>
           </a:p>
           <a:p>
@@ -704,7 +713,7 @@
             </a:r>
             <a:r>
               <a:rPr lang="en-US" b="0" dirty="0"/>
-              <a:t>When originally testing the Random Forest model, we were able to attain perfect precision for fraud detection. However, that came at a cost of very low recall and not detecting enough fraud cases. To account for the imbalanced datasets, where the minority class is underrepresented, we incorporated SMOTE with our random forest model.</a:t>
+              <a:t>To account for the imbalanced datasets, where the minority class is underrepresented, we incorporated SMOTE with our random forest model, which generated synthetic samples of the minority class to balance the data. However, it did not achieve the high recall values we were looking to obtain while improving precision.</a:t>
             </a:r>
           </a:p>
           <a:p>
@@ -743,32 +752,6 @@
                 <a:latin typeface=".AppleSystemUIFont"/>
               </a:rPr>
               <a:t>SMOTE is a data augmentation technique used to address class imbalance in datasets, especially in machine learning problems. It generates synthetic samples for the minority class by interpolating between existing minority class samples, rather than simply duplicating them. (looking at the 5 nearest neighbors by default)</a:t>
-            </a:r>
-          </a:p>
-          <a:p>
-            <a:endParaRPr lang="en-US" b="0" dirty="0"/>
-          </a:p>
-          <a:p>
-            <a:pPr marL="0" marR="0" lvl="0" indent="0" algn="l" defTabSz="914400" rtl="0" eaLnBrk="1" fontAlgn="auto" latinLnBrk="0" hangingPunct="1">
-              <a:lnSpc>
-                <a:spcPct val="100000"/>
-              </a:lnSpc>
-              <a:spcBef>
-                <a:spcPts val="0"/>
-              </a:spcBef>
-              <a:spcAft>
-                <a:spcPts val="0"/>
-              </a:spcAft>
-              <a:buClrTx/>
-              <a:buSzTx/>
-              <a:buFontTx/>
-              <a:buNone/>
-              <a:tabLst/>
-              <a:defRPr/>
-            </a:pPr>
-            <a:r>
-              <a:rPr lang="en-US" dirty="0"/>
-              <a:t>*If the priority is to detect as many frauds as possible, Logistic Regression is a good model due to the higher recall. However, if the priority is to reduce false positives while maintaining good accuracy, Random Forest with SMOTE appears to be the better option.</a:t>
             </a:r>
           </a:p>
           <a:p>
@@ -863,19 +846,6 @@
           <a:lstStyle/>
           <a:p>
             <a:r>
-              <a:rPr lang="en-US" b="1" dirty="0"/>
-              <a:t>Random Forest Model with SMOTE: </a:t>
-            </a:r>
-            <a:r>
-              <a:rPr lang="en-US" b="0" dirty="0"/>
-              <a:t>While Random Forest with SMOTE did a better job with precision than the logistic regression, precision was still on the low end, leading to more false positives.</a:t>
-            </a:r>
-          </a:p>
-          <a:p>
-            <a:endParaRPr lang="en-US" b="0" dirty="0"/>
-          </a:p>
-          <a:p>
-            <a:r>
               <a:rPr lang="en-US" b="1" dirty="0" err="1"/>
               <a:t>XGBoost</a:t>
             </a:r>
@@ -893,15 +863,7 @@
             </a:r>
             <a:r>
               <a:rPr lang="en-US" b="0" dirty="0"/>
-              <a:t> model significantly outperformed the Random Forest model with SMOTE in precision (57% versus 33%), with fewer false positives. While recall remained the same (48%), </a:t>
-            </a:r>
-            <a:r>
-              <a:rPr lang="en-US" b="0" dirty="0" err="1"/>
-              <a:t>XGBoost</a:t>
-            </a:r>
-            <a:r>
-              <a:rPr lang="en-US" b="0" dirty="0"/>
-              <a:t> achieved a better balance between precision and recall, with better performance in overall accuracy and in handling the imbalanced dataset.</a:t>
+              <a:t> model outperformed the Random Forest model with SMOTE in recall (75% versus 48%) for Class 1, fraudulent records. While this model is comparable to the original Logistic Regression model, the optimized performance and speed with which it is able to run our larger datasets made it the winning choice in the selection process.</a:t>
             </a:r>
             <a:endParaRPr lang="en-US" b="1" dirty="0"/>
           </a:p>
@@ -5763,40 +5725,142 @@
         <p:spPr>
           <a:xfrm>
             <a:off x="1097280" y="2108201"/>
-            <a:ext cx="6437367" cy="3760891"/>
+            <a:ext cx="6789420" cy="4134111"/>
           </a:xfrm>
         </p:spPr>
         <p:txBody>
           <a:bodyPr>
-            <a:normAutofit/>
+            <a:normAutofit fontScale="70000" lnSpcReduction="20000"/>
           </a:bodyPr>
           <a:lstStyle/>
           <a:p>
-            <a:pPr>
-              <a:lnSpc>
-                <a:spcPct val="100000"/>
-              </a:lnSpc>
-            </a:pPr>
-            <a:r>
-              <a:rPr lang="en-US">
+            <a:r>
+              <a:rPr lang="en-US" dirty="0">
+                <a:solidFill>
+                  <a:srgbClr val="0E0E0E"/>
+                </a:solidFill>
                 <a:effectLst/>
                 <a:latin typeface=".AppleSystemUIFont"/>
               </a:rPr>
-              <a:t>Our project involved two datasets of e-commerce transactions. The smaller dataset (Version 2), which included a binary indicator of fraudulence, was used to train a machine learning model. This trained model was then applied to the larger dataset (Version 1) to predict fraudulent transactions.</a:t>
+              <a:t>Our project focused on detecting fraudulent e-commerce transactions using machine learning. The analysis utilized two datasets:</a:t>
             </a:r>
           </a:p>
           <a:p>
             <a:pPr>
-              <a:lnSpc>
-                <a:spcPct val="100000"/>
-              </a:lnSpc>
+              <a:spcBef>
+                <a:spcPts val="900"/>
+              </a:spcBef>
             </a:pPr>
             <a:r>
-              <a:rPr lang="en-US">
+              <a:rPr lang="en-US" dirty="0">
+                <a:solidFill>
+                  <a:srgbClr val="0E0E0E"/>
+                </a:solidFill>
                 <a:effectLst/>
                 <a:latin typeface=".AppleSystemUIFont"/>
               </a:rPr>
-              <a:t>The primary goal of this project was to achieve a fraud detection model with a prediction accuracy of 75% or higher. Additionally, the model’s performance was compared to the original dataset’s fraud detection accuracy to evaluate its effectiveness.</a:t>
+              <a:t>• </a:t>
+            </a:r>
+            <a:r>
+              <a:rPr lang="en-US" b="1" dirty="0">
+                <a:solidFill>
+                  <a:srgbClr val="0E0E0E"/>
+                </a:solidFill>
+                <a:effectLst/>
+                <a:latin typeface=".AppleSystemUIFont"/>
+              </a:rPr>
+              <a:t>Version 1:</a:t>
+            </a:r>
+            <a:r>
+              <a:rPr lang="en-US" dirty="0">
+                <a:solidFill>
+                  <a:srgbClr val="0E0E0E"/>
+                </a:solidFill>
+                <a:effectLst/>
+                <a:latin typeface=".AppleSystemUIFont"/>
+              </a:rPr>
+              <a:t> A larger dataset containing 1,472,952 transactions without a binary fraud indicator. This dataset was used for testing the trained model.</a:t>
+            </a:r>
+          </a:p>
+          <a:p>
+            <a:pPr>
+              <a:spcBef>
+                <a:spcPts val="900"/>
+              </a:spcBef>
+            </a:pPr>
+            <a:r>
+              <a:rPr lang="en-US" dirty="0">
+                <a:solidFill>
+                  <a:srgbClr val="0E0E0E"/>
+                </a:solidFill>
+                <a:effectLst/>
+                <a:latin typeface=".AppleSystemUIFont"/>
+              </a:rPr>
+              <a:t>• </a:t>
+            </a:r>
+            <a:r>
+              <a:rPr lang="en-US" b="1" dirty="0">
+                <a:solidFill>
+                  <a:srgbClr val="0E0E0E"/>
+                </a:solidFill>
+                <a:effectLst/>
+                <a:latin typeface=".AppleSystemUIFont"/>
+              </a:rPr>
+              <a:t>Version 2:</a:t>
+            </a:r>
+            <a:r>
+              <a:rPr lang="en-US" dirty="0">
+                <a:solidFill>
+                  <a:srgbClr val="0E0E0E"/>
+                </a:solidFill>
+                <a:effectLst/>
+                <a:latin typeface=".AppleSystemUIFont"/>
+              </a:rPr>
+              <a:t> A smaller dataset containing 23,634 transactions, which included a binary indicator of fraudulence (1 for fraudulent, 0 for legitimate). This dataset was used for training and evaluating machine learning models.</a:t>
+            </a:r>
+          </a:p>
+          <a:p>
+            <a:r>
+              <a:rPr lang="en-US" dirty="0">
+                <a:solidFill>
+                  <a:srgbClr val="0E0E0E"/>
+                </a:solidFill>
+                <a:effectLst/>
+                <a:latin typeface=".AppleSystemUIFont"/>
+              </a:rPr>
+              <a:t>Initially, the goal was to develop a fraud detection model with an overall prediction accuracy of 75% or higher. However, due to the highly imbalanced nature of the dataset, where fraudulent transactions comprised only 5% of the total, we shifted our focus. The revised objective prioritized </a:t>
+            </a:r>
+            <a:r>
+              <a:rPr lang="en-US" b="1" dirty="0">
+                <a:solidFill>
+                  <a:srgbClr val="0E0E0E"/>
+                </a:solidFill>
+                <a:effectLst/>
+                <a:latin typeface=".AppleSystemUIFont"/>
+              </a:rPr>
+              <a:t>recall</a:t>
+            </a:r>
+            <a:r>
+              <a:rPr lang="en-US" dirty="0">
+                <a:solidFill>
+                  <a:srgbClr val="0E0E0E"/>
+                </a:solidFill>
+                <a:effectLst/>
+                <a:latin typeface=".AppleSystemUIFont"/>
+              </a:rPr>
+              <a:t> (the ability to correctly identify fraudulent transactions) and aimed for a recall value of 75% or higher. This approach aligned with the project’s ultimate goal of minimizing missed fraudulent transactions, even if it meant tolerating a slightly higher rate of false positives.</a:t>
+            </a:r>
+          </a:p>
+          <a:p>
+            <a:r>
+              <a:rPr lang="en-US" dirty="0">
+                <a:solidFill>
+                  <a:srgbClr val="0E0E0E"/>
+                </a:solidFill>
+                <a:effectLst/>
+                <a:latin typeface=".AppleSystemUIFont"/>
+              </a:rPr>
+              <a:t>By balancing precision and recall, our project sought to build an effective fraud detection model that could perform well on both the small training dataset and the larger test dataset.</a:t>
             </a:r>
           </a:p>
         </p:txBody>
@@ -6206,12 +6270,51 @@
           </a:p>
         </p:txBody>
       </p:sp>
+      <p:sp>
+        <p:nvSpPr>
+          <p:cNvPr id="12" name="TextBox 11">
+            <a:extLst>
+              <a:ext uri="{FF2B5EF4-FFF2-40B4-BE49-F238E27FC236}">
+                <a16:creationId xmlns:a16="http://schemas.microsoft.com/office/drawing/2014/main" id="{66612E7C-ECAD-1ED2-1015-B75ECD72C6FA}"/>
+              </a:ext>
+            </a:extLst>
+          </p:cNvPr>
+          <p:cNvSpPr txBox="1"/>
+          <p:nvPr/>
+        </p:nvSpPr>
+        <p:spPr>
+          <a:xfrm>
+            <a:off x="6623957" y="2325745"/>
+            <a:ext cx="4272388" cy="369332"/>
+          </a:xfrm>
+          <a:prstGeom prst="rect">
+            <a:avLst/>
+          </a:prstGeom>
+          <a:noFill/>
+        </p:spPr>
+        <p:txBody>
+          <a:bodyPr wrap="square" rtlCol="0">
+            <a:spAutoFit/>
+          </a:bodyPr>
+          <a:lstStyle/>
+          <a:p>
+            <a:r>
+              <a:rPr lang="en-US" dirty="0" err="1"/>
+              <a:t>XGBoost</a:t>
+            </a:r>
+            <a:r>
+              <a:rPr lang="en-US" dirty="0"/>
+              <a:t> Model</a:t>
+            </a:r>
+          </a:p>
+        </p:txBody>
+      </p:sp>
       <p:pic>
         <p:nvPicPr>
-          <p:cNvPr id="11" name="Picture 10" descr="A screenshot of a computer&#10;&#10;Description automatically generated">
+          <p:cNvPr id="4" name="Picture 3" descr="A screenshot of a computer screen&#10;&#10;Description automatically generated">
             <a:extLst>
               <a:ext uri="{FF2B5EF4-FFF2-40B4-BE49-F238E27FC236}">
-                <a16:creationId xmlns:a16="http://schemas.microsoft.com/office/drawing/2014/main" id="{5A9F481A-69AC-F03B-60E2-69F996CE4E9A}"/>
+                <a16:creationId xmlns:a16="http://schemas.microsoft.com/office/drawing/2014/main" id="{72492017-423B-71CF-C00E-ECA04ABB610A}"/>
               </a:ext>
             </a:extLst>
           </p:cNvPr>
@@ -6228,53 +6331,14 @@
         </p:blipFill>
         <p:spPr>
           <a:xfrm>
-            <a:off x="6623957" y="2854054"/>
-            <a:ext cx="5410200" cy="1968500"/>
+            <a:off x="6468367" y="2879539"/>
+            <a:ext cx="5105400" cy="1892300"/>
           </a:xfrm>
           <a:prstGeom prst="rect">
             <a:avLst/>
           </a:prstGeom>
         </p:spPr>
       </p:pic>
-      <p:sp>
-        <p:nvSpPr>
-          <p:cNvPr id="12" name="TextBox 11">
-            <a:extLst>
-              <a:ext uri="{FF2B5EF4-FFF2-40B4-BE49-F238E27FC236}">
-                <a16:creationId xmlns:a16="http://schemas.microsoft.com/office/drawing/2014/main" id="{66612E7C-ECAD-1ED2-1015-B75ECD72C6FA}"/>
-              </a:ext>
-            </a:extLst>
-          </p:cNvPr>
-          <p:cNvSpPr txBox="1"/>
-          <p:nvPr/>
-        </p:nvSpPr>
-        <p:spPr>
-          <a:xfrm>
-            <a:off x="6623957" y="2325745"/>
-            <a:ext cx="4272388" cy="369332"/>
-          </a:xfrm>
-          <a:prstGeom prst="rect">
-            <a:avLst/>
-          </a:prstGeom>
-          <a:noFill/>
-        </p:spPr>
-        <p:txBody>
-          <a:bodyPr wrap="square" rtlCol="0">
-            <a:spAutoFit/>
-          </a:bodyPr>
-          <a:lstStyle/>
-          <a:p>
-            <a:r>
-              <a:rPr lang="en-US" dirty="0" err="1"/>
-              <a:t>XGBoost</a:t>
-            </a:r>
-            <a:r>
-              <a:rPr lang="en-US" dirty="0"/>
-              <a:t> Model</a:t>
-            </a:r>
-          </a:p>
-        </p:txBody>
-      </p:sp>
     </p:spTree>
     <p:extLst>
       <p:ext uri="{BB962C8B-B14F-4D97-AF65-F5344CB8AC3E}">
@@ -6810,7 +6874,7 @@
             <a:pPr algn="r"/>
             <a:r>
               <a:rPr lang="en-US" dirty="0"/>
-              <a:t>Analysis &amp; Conclusion</a:t>
+              <a:t>Conclusion</a:t>
             </a:r>
           </a:p>
         </p:txBody>
@@ -6896,6 +6960,15 @@
           </a:bodyPr>
           <a:lstStyle/>
           <a:p>
+            <a:endParaRPr lang="en-US" dirty="0">
+              <a:solidFill>
+                <a:srgbClr val="0E0E0E"/>
+              </a:solidFill>
+              <a:effectLst/>
+              <a:latin typeface=".AppleSystemUIFont"/>
+            </a:endParaRPr>
+          </a:p>
+          <a:p>
             <a:r>
               <a:rPr lang="en-US" dirty="0">
                 <a:solidFill>
@@ -6904,10 +6977,10 @@
                 <a:effectLst/>
                 <a:latin typeface=".AppleSystemUIFont"/>
               </a:rPr>
-              <a:t>While the model performs well overall (95% accuracy), its ability to detect fraudulent transactions specifically (Class 1 metrics) falls short of the target. The highest F1-Score we were able to achieve for Class 1 using our </a:t>
-            </a:r>
-            <a:r>
-              <a:rPr lang="en-US" dirty="0" err="1">
+              <a:t>The </a:t>
+            </a:r>
+            <a:r>
+              <a:rPr lang="en-US" b="1" dirty="0" err="1">
                 <a:solidFill>
                   <a:srgbClr val="0E0E0E"/>
                 </a:solidFill>
@@ -6917,6 +6990,16 @@
               <a:t>XGBoost</a:t>
             </a:r>
             <a:r>
+              <a:rPr lang="en-US" b="1" dirty="0">
+                <a:solidFill>
+                  <a:srgbClr val="0E0E0E"/>
+                </a:solidFill>
+                <a:effectLst/>
+                <a:latin typeface=".AppleSystemUIFont"/>
+              </a:rPr>
+              <a:t> model</a:t>
+            </a:r>
+            <a:r>
               <a:rPr lang="en-US" dirty="0">
                 <a:solidFill>
                   <a:srgbClr val="0E0E0E"/>
@@ -6924,7 +7007,59 @@
                 <a:effectLst/>
                 <a:latin typeface=".AppleSystemUIFont"/>
               </a:rPr>
-              <a:t> model was 52% of the 75% or more goal.</a:t>
+              <a:t> was decided to be the most effective solution for detecting fraudulent e-commerce transactions based on accuracy and speed. While the original goal of achieving 75% overall prediction accuracy was reconsidered due to the imbalanced dataset, the new focus on </a:t>
+            </a:r>
+            <a:r>
+              <a:rPr lang="en-US" b="1" dirty="0">
+                <a:solidFill>
+                  <a:srgbClr val="0E0E0E"/>
+                </a:solidFill>
+                <a:effectLst/>
+                <a:latin typeface=".AppleSystemUIFont"/>
+              </a:rPr>
+              <a:t>recall</a:t>
+            </a:r>
+            <a:r>
+              <a:rPr lang="en-US" dirty="0">
+                <a:solidFill>
+                  <a:srgbClr val="0E0E0E"/>
+                </a:solidFill>
+                <a:effectLst/>
+                <a:latin typeface=".AppleSystemUIFont"/>
+              </a:rPr>
+              <a:t> ensured the detection of a significant proportion of fraudulent transactions.</a:t>
+            </a:r>
+          </a:p>
+          <a:p>
+            <a:r>
+              <a:rPr lang="en-US" dirty="0">
+                <a:solidFill>
+                  <a:srgbClr val="0E0E0E"/>
+                </a:solidFill>
+                <a:effectLst/>
+                <a:latin typeface=".AppleSystemUIFont"/>
+              </a:rPr>
+              <a:t>The final model provided a </a:t>
+            </a:r>
+            <a:r>
+              <a:rPr lang="en-US" b="1" dirty="0">
+                <a:solidFill>
+                  <a:srgbClr val="0E0E0E"/>
+                </a:solidFill>
+                <a:effectLst/>
+                <a:latin typeface=".AppleSystemUIFont"/>
+              </a:rPr>
+              <a:t>recall of 75%</a:t>
+            </a:r>
+            <a:r>
+              <a:rPr lang="en-US" dirty="0">
+                <a:solidFill>
+                  <a:srgbClr val="0E0E0E"/>
+                </a:solidFill>
+                <a:effectLst/>
+                <a:latin typeface=".AppleSystemUIFont"/>
+              </a:rPr>
+              <a:t>, which means 3 out of 4 fraudulent transactions were correctly identified. This result demonstrates the model’s effectiveness in high-stakes scenarios where missing fraudulent cases is costlier than flagging legitimate ones. The decision threshold can be adjusted to optimize the balance between precision and recall, allowing for quick adaptability to business needs, while maintaining speed and scalability for large-scale datasets.</a:t>
             </a:r>
           </a:p>
           <a:p>

</xml_diff>